<commit_message>
added sls and h2
</commit_message>
<xml_diff>
--- a/reports/final_pres.pptx
+++ b/reports/final_pres.pptx
@@ -7,14 +7,22 @@
   <p:sldIdLst>
     <p:sldId id="256" r:id="rId2"/>
     <p:sldId id="257" r:id="rId3"/>
-    <p:sldId id="258" r:id="rId4"/>
-    <p:sldId id="259" r:id="rId5"/>
-    <p:sldId id="260" r:id="rId6"/>
-    <p:sldId id="261" r:id="rId7"/>
-    <p:sldId id="262" r:id="rId8"/>
-    <p:sldId id="263" r:id="rId9"/>
-    <p:sldId id="264" r:id="rId10"/>
-    <p:sldId id="265" r:id="rId11"/>
+    <p:sldId id="266" r:id="rId4"/>
+    <p:sldId id="267" r:id="rId5"/>
+    <p:sldId id="269" r:id="rId6"/>
+    <p:sldId id="271" r:id="rId7"/>
+    <p:sldId id="270" r:id="rId8"/>
+    <p:sldId id="258" r:id="rId9"/>
+    <p:sldId id="272" r:id="rId10"/>
+    <p:sldId id="273" r:id="rId11"/>
+    <p:sldId id="274" r:id="rId12"/>
+    <p:sldId id="275" r:id="rId13"/>
+    <p:sldId id="260" r:id="rId14"/>
+    <p:sldId id="261" r:id="rId15"/>
+    <p:sldId id="262" r:id="rId16"/>
+    <p:sldId id="263" r:id="rId17"/>
+    <p:sldId id="264" r:id="rId18"/>
+    <p:sldId id="265" r:id="rId19"/>
   </p:sldIdLst>
   <p:sldSz cx="12192000" cy="6858000"/>
   <p:notesSz cx="6858000" cy="9144000"/>
@@ -113,6 +121,11 @@
       </a:defRPr>
     </a:lvl9pPr>
   </p:defaultTextStyle>
+  <p:extLst>
+    <p:ext uri="{EFAFB233-063F-42B5-8137-9DF3F51BA10A}">
+      <p15:sldGuideLst xmlns:p15="http://schemas.microsoft.com/office/powerpoint/2012/main"/>
+    </p:ext>
+  </p:extLst>
 </p:presentation>
 </file>
 
@@ -215,7 +228,7 @@
           <a:effectLst/>
           <a:extLst>
             <a:ext uri="{91240B29-F687-4f45-9708-019B960494DF}">
-              <a14:hiddenLine xmlns:a14="http://schemas.microsoft.com/office/drawing/2010/main" xmlns="" w="9525">
+              <a14:hiddenLine xmlns="" xmlns:a14="http://schemas.microsoft.com/office/drawing/2010/main" w="9525">
                 <a:solidFill>
                   <a:srgbClr val="000000"/>
                 </a:solidFill>
@@ -1725,7 +1738,7 @@
           <a:ln/>
           <a:extLst>
             <a:ext uri="{91240B29-F687-4f45-9708-019B960494DF}">
-              <a14:hiddenLine xmlns:a14="http://schemas.microsoft.com/office/drawing/2010/main" xmlns="" w="9525">
+              <a14:hiddenLine xmlns="" xmlns:a14="http://schemas.microsoft.com/office/drawing/2010/main" w="9525">
                 <a:solidFill>
                   <a:srgbClr val="000000"/>
                 </a:solidFill>
@@ -1997,7 +2010,7 @@
           <a:ln/>
           <a:extLst>
             <a:ext uri="{91240B29-F687-4f45-9708-019B960494DF}">
-              <a14:hiddenLine xmlns:a14="http://schemas.microsoft.com/office/drawing/2010/main" xmlns="" w="9525">
+              <a14:hiddenLine xmlns="" xmlns:a14="http://schemas.microsoft.com/office/drawing/2010/main" w="9525">
                 <a:solidFill>
                   <a:srgbClr val="000000"/>
                 </a:solidFill>
@@ -2277,7 +2290,7 @@
           <a:ln/>
           <a:extLst>
             <a:ext uri="{91240B29-F687-4f45-9708-019B960494DF}">
-              <a14:hiddenLine xmlns:a14="http://schemas.microsoft.com/office/drawing/2010/main" xmlns="" w="9525">
+              <a14:hiddenLine xmlns="" xmlns:a14="http://schemas.microsoft.com/office/drawing/2010/main" w="9525">
                 <a:solidFill>
                   <a:srgbClr val="000000"/>
                 </a:solidFill>
@@ -2897,7 +2910,7 @@
           <a:ln/>
           <a:extLst>
             <a:ext uri="{91240B29-F687-4f45-9708-019B960494DF}">
-              <a14:hiddenLine xmlns:a14="http://schemas.microsoft.com/office/drawing/2010/main" xmlns="" w="9525">
+              <a14:hiddenLine xmlns="" xmlns:a14="http://schemas.microsoft.com/office/drawing/2010/main" w="9525">
                 <a:solidFill>
                   <a:srgbClr val="000000"/>
                 </a:solidFill>
@@ -3233,7 +3246,7 @@
           <a:ln/>
           <a:extLst>
             <a:ext uri="{91240B29-F687-4f45-9708-019B960494DF}">
-              <a14:hiddenLine xmlns:a14="http://schemas.microsoft.com/office/drawing/2010/main" xmlns="" w="9525">
+              <a14:hiddenLine xmlns="" xmlns:a14="http://schemas.microsoft.com/office/drawing/2010/main" w="9525">
                 <a:solidFill>
                   <a:srgbClr val="000000"/>
                 </a:solidFill>
@@ -3707,7 +3720,7 @@
           <a:ln/>
           <a:extLst>
             <a:ext uri="{91240B29-F687-4f45-9708-019B960494DF}">
-              <a14:hiddenLine xmlns:a14="http://schemas.microsoft.com/office/drawing/2010/main" xmlns="" w="9525">
+              <a14:hiddenLine xmlns="" xmlns:a14="http://schemas.microsoft.com/office/drawing/2010/main" w="9525">
                 <a:solidFill>
                   <a:srgbClr val="000000"/>
                 </a:solidFill>
@@ -4130,7 +4143,7 @@
           <a:ln/>
           <a:extLst>
             <a:ext uri="{91240B29-F687-4f45-9708-019B960494DF}">
-              <a14:hiddenLine xmlns:a14="http://schemas.microsoft.com/office/drawing/2010/main" xmlns="" w="9525">
+              <a14:hiddenLine xmlns="" xmlns:a14="http://schemas.microsoft.com/office/drawing/2010/main" w="9525">
                 <a:solidFill>
                   <a:srgbClr val="000000"/>
                 </a:solidFill>
@@ -5450,6 +5463,931 @@
           <a:chExt cx="0" cy="0"/>
         </a:xfrm>
       </p:grpSpPr>
+      <p:pic>
+        <p:nvPicPr>
+          <p:cNvPr id="3" name="Graphic 2">
+            <a:extLst>
+              <a:ext uri="{FF2B5EF4-FFF2-40B4-BE49-F238E27FC236}">
+                <a16:creationId xmlns:a16="http://schemas.microsoft.com/office/drawing/2014/main" id="{DD0DAB76-A607-49DD-9317-D931935E7F32}"/>
+              </a:ext>
+            </a:extLst>
+          </p:cNvPr>
+          <p:cNvPicPr>
+            <a:picLocks noChangeAspect="1"/>
+          </p:cNvPicPr>
+          <p:nvPr/>
+        </p:nvPicPr>
+        <p:blipFill>
+          <a:blip r:embed="rId2">
+            <a:extLst>
+              <a:ext uri="{96DAC541-7B7A-43D3-8B79-37D633B846F1}">
+                <asvg:svgBlip xmlns:asvg="http://schemas.microsoft.com/office/drawing/2016/SVG/main" r:embed="rId3"/>
+              </a:ext>
+            </a:extLst>
+          </a:blip>
+          <a:stretch>
+            <a:fillRect/>
+          </a:stretch>
+        </p:blipFill>
+        <p:spPr>
+          <a:xfrm>
+            <a:off x="6848702" y="2200307"/>
+            <a:ext cx="4953742" cy="4316628"/>
+          </a:xfrm>
+          <a:prstGeom prst="rect">
+            <a:avLst/>
+          </a:prstGeom>
+        </p:spPr>
+      </p:pic>
+      <p:sp>
+        <p:nvSpPr>
+          <p:cNvPr id="2" name="Title 1">
+            <a:extLst>
+              <a:ext uri="{FF2B5EF4-FFF2-40B4-BE49-F238E27FC236}">
+                <a16:creationId xmlns:a16="http://schemas.microsoft.com/office/drawing/2014/main" id="{B3727FEA-138A-44E1-8EBD-F5FE3E8D75E1}"/>
+              </a:ext>
+            </a:extLst>
+          </p:cNvPr>
+          <p:cNvSpPr>
+            <a:spLocks noGrp="1"/>
+          </p:cNvSpPr>
+          <p:nvPr>
+            <p:ph type="title"/>
+          </p:nvPr>
+        </p:nvSpPr>
+        <p:spPr/>
+        <p:txBody>
+          <a:bodyPr/>
+          <a:lstStyle/>
+          <a:p>
+            <a:r>
+              <a:rPr lang="en-GB" dirty="0"/>
+              <a:t>What is a controller?</a:t>
+            </a:r>
+          </a:p>
+        </p:txBody>
+      </p:sp>
+      <p:sp>
+        <p:nvSpPr>
+          <p:cNvPr id="5" name="Content Placeholder 2">
+            <a:extLst>
+              <a:ext uri="{FF2B5EF4-FFF2-40B4-BE49-F238E27FC236}">
+                <a16:creationId xmlns:a16="http://schemas.microsoft.com/office/drawing/2014/main" id="{F4558A00-AC44-4181-9136-6C43FA63A0CE}"/>
+              </a:ext>
+            </a:extLst>
+          </p:cNvPr>
+          <p:cNvSpPr>
+            <a:spLocks noGrp="1"/>
+          </p:cNvSpPr>
+          <p:nvPr>
+            <p:ph idx="1"/>
+          </p:nvPr>
+        </p:nvSpPr>
+        <p:spPr>
+          <a:xfrm>
+            <a:off x="819150" y="2222500"/>
+            <a:ext cx="4622800" cy="3636963"/>
+          </a:xfrm>
+        </p:spPr>
+        <p:txBody>
+          <a:bodyPr>
+            <a:normAutofit/>
+          </a:bodyPr>
+          <a:lstStyle/>
+          <a:p>
+            <a:pPr marL="0" indent="0" algn="ctr">
+              <a:buNone/>
+            </a:pPr>
+            <a:r>
+              <a:rPr lang="en-GB" sz="3200" dirty="0"/>
+              <a:t>x[k+1] = </a:t>
+            </a:r>
+            <a:r>
+              <a:rPr lang="en-GB" sz="3200" dirty="0" err="1"/>
+              <a:t>Ax</a:t>
+            </a:r>
+            <a:r>
+              <a:rPr lang="en-GB" sz="3200" dirty="0"/>
+              <a:t>[k]+Bu[k]</a:t>
+            </a:r>
+          </a:p>
+          <a:p>
+            <a:pPr marL="0" indent="0" algn="ctr">
+              <a:buNone/>
+            </a:pPr>
+            <a:r>
+              <a:rPr lang="en-GB" sz="3200" dirty="0"/>
+              <a:t>u[k]=</a:t>
+            </a:r>
+            <a:r>
+              <a:rPr lang="en-GB" sz="3200" dirty="0" err="1"/>
+              <a:t>Kx</a:t>
+            </a:r>
+            <a:r>
+              <a:rPr lang="en-GB" sz="3200" dirty="0"/>
+              <a:t>[k]</a:t>
+            </a:r>
+          </a:p>
+        </p:txBody>
+      </p:sp>
+    </p:spTree>
+    <p:extLst>
+      <p:ext uri="{BB962C8B-B14F-4D97-AF65-F5344CB8AC3E}">
+        <p14:creationId xmlns:p14="http://schemas.microsoft.com/office/powerpoint/2010/main" val="2071110961"/>
+      </p:ext>
+    </p:extLst>
+  </p:cSld>
+  <p:clrMapOvr>
+    <a:masterClrMapping/>
+  </p:clrMapOvr>
+</p:sld>
+</file>
+
+<file path=ppt/slides/slide11.xml><?xml version="1.0" encoding="utf-8"?>
+<p:sld xmlns:a="http://schemas.openxmlformats.org/drawingml/2006/main" xmlns:r="http://schemas.openxmlformats.org/officeDocument/2006/relationships" xmlns:p="http://schemas.openxmlformats.org/presentationml/2006/main">
+  <p:cSld>
+    <p:spTree>
+      <p:nvGrpSpPr>
+        <p:cNvPr id="1" name=""/>
+        <p:cNvGrpSpPr/>
+        <p:nvPr/>
+      </p:nvGrpSpPr>
+      <p:grpSpPr>
+        <a:xfrm>
+          <a:off x="0" y="0"/>
+          <a:ext cx="0" cy="0"/>
+          <a:chOff x="0" y="0"/>
+          <a:chExt cx="0" cy="0"/>
+        </a:xfrm>
+      </p:grpSpPr>
+      <p:pic>
+        <p:nvPicPr>
+          <p:cNvPr id="3" name="Graphic 2">
+            <a:extLst>
+              <a:ext uri="{FF2B5EF4-FFF2-40B4-BE49-F238E27FC236}">
+                <a16:creationId xmlns:a16="http://schemas.microsoft.com/office/drawing/2014/main" id="{DD0DAB76-A607-49DD-9317-D931935E7F32}"/>
+              </a:ext>
+            </a:extLst>
+          </p:cNvPr>
+          <p:cNvPicPr>
+            <a:picLocks noChangeAspect="1"/>
+          </p:cNvPicPr>
+          <p:nvPr/>
+        </p:nvPicPr>
+        <p:blipFill>
+          <a:blip r:embed="rId2">
+            <a:extLst>
+              <a:ext uri="{96DAC541-7B7A-43D3-8B79-37D633B846F1}">
+                <asvg:svgBlip xmlns:asvg="http://schemas.microsoft.com/office/drawing/2016/SVG/main" r:embed="rId3"/>
+              </a:ext>
+            </a:extLst>
+          </a:blip>
+          <a:stretch>
+            <a:fillRect/>
+          </a:stretch>
+        </p:blipFill>
+        <p:spPr>
+          <a:xfrm>
+            <a:off x="6848702" y="2200307"/>
+            <a:ext cx="4953742" cy="4316628"/>
+          </a:xfrm>
+          <a:prstGeom prst="rect">
+            <a:avLst/>
+          </a:prstGeom>
+        </p:spPr>
+      </p:pic>
+      <p:sp>
+        <p:nvSpPr>
+          <p:cNvPr id="2" name="Title 1">
+            <a:extLst>
+              <a:ext uri="{FF2B5EF4-FFF2-40B4-BE49-F238E27FC236}">
+                <a16:creationId xmlns:a16="http://schemas.microsoft.com/office/drawing/2014/main" id="{B3727FEA-138A-44E1-8EBD-F5FE3E8D75E1}"/>
+              </a:ext>
+            </a:extLst>
+          </p:cNvPr>
+          <p:cNvSpPr>
+            <a:spLocks noGrp="1"/>
+          </p:cNvSpPr>
+          <p:nvPr>
+            <p:ph type="title"/>
+          </p:nvPr>
+        </p:nvSpPr>
+        <p:spPr/>
+        <p:txBody>
+          <a:bodyPr/>
+          <a:lstStyle/>
+          <a:p>
+            <a:r>
+              <a:rPr lang="en-GB" dirty="0"/>
+              <a:t>Least Quadratic Regulator (LQR)</a:t>
+            </a:r>
+          </a:p>
+        </p:txBody>
+      </p:sp>
+      <p:sp>
+        <p:nvSpPr>
+          <p:cNvPr id="5" name="Content Placeholder 2">
+            <a:extLst>
+              <a:ext uri="{FF2B5EF4-FFF2-40B4-BE49-F238E27FC236}">
+                <a16:creationId xmlns:a16="http://schemas.microsoft.com/office/drawing/2014/main" id="{F4558A00-AC44-4181-9136-6C43FA63A0CE}"/>
+              </a:ext>
+            </a:extLst>
+          </p:cNvPr>
+          <p:cNvSpPr>
+            <a:spLocks noGrp="1"/>
+          </p:cNvSpPr>
+          <p:nvPr>
+            <p:ph idx="1"/>
+          </p:nvPr>
+        </p:nvSpPr>
+        <p:spPr>
+          <a:xfrm>
+            <a:off x="819150" y="2222500"/>
+            <a:ext cx="4622800" cy="3636963"/>
+          </a:xfrm>
+        </p:spPr>
+        <p:txBody>
+          <a:bodyPr>
+            <a:normAutofit/>
+          </a:bodyPr>
+          <a:lstStyle/>
+          <a:p>
+            <a:pPr marL="0" indent="0" algn="ctr">
+              <a:buNone/>
+            </a:pPr>
+            <a:r>
+              <a:rPr lang="en-GB" sz="3200" dirty="0"/>
+              <a:t>x[k+1] = </a:t>
+            </a:r>
+            <a:r>
+              <a:rPr lang="en-GB" sz="3200" dirty="0" err="1"/>
+              <a:t>Ax</a:t>
+            </a:r>
+            <a:r>
+              <a:rPr lang="en-GB" sz="3200" dirty="0"/>
+              <a:t>[k]+Bu[k]</a:t>
+            </a:r>
+          </a:p>
+          <a:p>
+            <a:pPr marL="0" indent="0" algn="ctr">
+              <a:buNone/>
+            </a:pPr>
+            <a:r>
+              <a:rPr lang="en-GB" sz="3200" dirty="0"/>
+              <a:t>u[k]=</a:t>
+            </a:r>
+            <a:r>
+              <a:rPr lang="en-GB" sz="3200" dirty="0" err="1"/>
+              <a:t>Kx</a:t>
+            </a:r>
+            <a:r>
+              <a:rPr lang="en-GB" sz="3200" dirty="0"/>
+              <a:t>[k]</a:t>
+            </a:r>
+          </a:p>
+          <a:p>
+            <a:pPr marL="0" indent="0" algn="ctr">
+              <a:buNone/>
+            </a:pPr>
+            <a:r>
+              <a:rPr lang="en-GB" sz="3200" dirty="0"/>
+              <a:t>K = …</a:t>
+            </a:r>
+          </a:p>
+          <a:p>
+            <a:pPr marL="0" indent="0" algn="ctr">
+              <a:buNone/>
+            </a:pPr>
+            <a:r>
+              <a:rPr lang="en-GB" sz="3200" dirty="0"/>
+              <a:t>P = …</a:t>
+            </a:r>
+          </a:p>
+        </p:txBody>
+      </p:sp>
+    </p:spTree>
+    <p:extLst>
+      <p:ext uri="{BB962C8B-B14F-4D97-AF65-F5344CB8AC3E}">
+        <p14:creationId xmlns:p14="http://schemas.microsoft.com/office/powerpoint/2010/main" val="839781569"/>
+      </p:ext>
+    </p:extLst>
+  </p:cSld>
+  <p:clrMapOvr>
+    <a:masterClrMapping/>
+  </p:clrMapOvr>
+</p:sld>
+</file>
+
+<file path=ppt/slides/slide12.xml><?xml version="1.0" encoding="utf-8"?>
+<p:sld xmlns:a="http://schemas.openxmlformats.org/drawingml/2006/main" xmlns:r="http://schemas.openxmlformats.org/officeDocument/2006/relationships" xmlns:p="http://schemas.openxmlformats.org/presentationml/2006/main">
+  <p:cSld>
+    <p:spTree>
+      <p:nvGrpSpPr>
+        <p:cNvPr id="1" name=""/>
+        <p:cNvGrpSpPr/>
+        <p:nvPr/>
+      </p:nvGrpSpPr>
+      <p:grpSpPr>
+        <a:xfrm>
+          <a:off x="0" y="0"/>
+          <a:ext cx="0" cy="0"/>
+          <a:chOff x="0" y="0"/>
+          <a:chExt cx="0" cy="0"/>
+        </a:xfrm>
+      </p:grpSpPr>
+      <p:sp>
+        <p:nvSpPr>
+          <p:cNvPr id="2" name="Title 1">
+            <a:extLst>
+              <a:ext uri="{FF2B5EF4-FFF2-40B4-BE49-F238E27FC236}">
+                <a16:creationId xmlns:a16="http://schemas.microsoft.com/office/drawing/2014/main" id="{B3727FEA-138A-44E1-8EBD-F5FE3E8D75E1}"/>
+              </a:ext>
+            </a:extLst>
+          </p:cNvPr>
+          <p:cNvSpPr>
+            <a:spLocks noGrp="1"/>
+          </p:cNvSpPr>
+          <p:nvPr>
+            <p:ph type="title"/>
+          </p:nvPr>
+        </p:nvSpPr>
+        <p:spPr/>
+        <p:txBody>
+          <a:bodyPr/>
+          <a:lstStyle/>
+          <a:p>
+            <a:r>
+              <a:rPr lang="en-GB" dirty="0"/>
+              <a:t>Least Quadratic Regulator (LQR)</a:t>
+            </a:r>
+          </a:p>
+        </p:txBody>
+      </p:sp>
+      <p:sp>
+        <p:nvSpPr>
+          <p:cNvPr id="5" name="Content Placeholder 2">
+            <a:extLst>
+              <a:ext uri="{FF2B5EF4-FFF2-40B4-BE49-F238E27FC236}">
+                <a16:creationId xmlns:a16="http://schemas.microsoft.com/office/drawing/2014/main" id="{F4558A00-AC44-4181-9136-6C43FA63A0CE}"/>
+              </a:ext>
+            </a:extLst>
+          </p:cNvPr>
+          <p:cNvSpPr>
+            <a:spLocks noGrp="1"/>
+          </p:cNvSpPr>
+          <p:nvPr>
+            <p:ph idx="1"/>
+          </p:nvPr>
+        </p:nvSpPr>
+        <p:spPr>
+          <a:xfrm>
+            <a:off x="819150" y="2222500"/>
+            <a:ext cx="4622800" cy="3636963"/>
+          </a:xfrm>
+        </p:spPr>
+        <p:txBody>
+          <a:bodyPr>
+            <a:normAutofit/>
+          </a:bodyPr>
+          <a:lstStyle/>
+          <a:p>
+            <a:pPr marL="0" indent="0" algn="ctr">
+              <a:buNone/>
+            </a:pPr>
+            <a:r>
+              <a:rPr lang="en-GB" sz="3200" dirty="0"/>
+              <a:t>x[k+1] = </a:t>
+            </a:r>
+            <a:r>
+              <a:rPr lang="en-GB" sz="3200" dirty="0" err="1"/>
+              <a:t>Ax</a:t>
+            </a:r>
+            <a:r>
+              <a:rPr lang="en-GB" sz="3200" dirty="0"/>
+              <a:t>[k]+Bu[k]</a:t>
+            </a:r>
+          </a:p>
+          <a:p>
+            <a:pPr marL="0" indent="0" algn="ctr">
+              <a:buNone/>
+            </a:pPr>
+            <a:r>
+              <a:rPr lang="en-GB" sz="3200" dirty="0"/>
+              <a:t>u[k]=</a:t>
+            </a:r>
+            <a:r>
+              <a:rPr lang="en-GB" sz="3200" dirty="0" err="1"/>
+              <a:t>Kx</a:t>
+            </a:r>
+            <a:r>
+              <a:rPr lang="en-GB" sz="3200" dirty="0"/>
+              <a:t>[k]</a:t>
+            </a:r>
+          </a:p>
+          <a:p>
+            <a:pPr marL="0" indent="0" algn="ctr">
+              <a:buNone/>
+            </a:pPr>
+            <a:r>
+              <a:rPr lang="en-GB" sz="3200" dirty="0"/>
+              <a:t>K = …</a:t>
+            </a:r>
+          </a:p>
+          <a:p>
+            <a:pPr marL="0" indent="0" algn="ctr">
+              <a:buNone/>
+            </a:pPr>
+            <a:r>
+              <a:rPr lang="en-GB" sz="3200" dirty="0"/>
+              <a:t>P = …</a:t>
+            </a:r>
+          </a:p>
+        </p:txBody>
+      </p:sp>
+      <p:sp>
+        <p:nvSpPr>
+          <p:cNvPr id="4" name="TextBox 3">
+            <a:extLst>
+              <a:ext uri="{FF2B5EF4-FFF2-40B4-BE49-F238E27FC236}">
+                <a16:creationId xmlns:a16="http://schemas.microsoft.com/office/drawing/2014/main" id="{12A204B6-DDC8-471A-8733-812AA65C81D4}"/>
+              </a:ext>
+            </a:extLst>
+          </p:cNvPr>
+          <p:cNvSpPr txBox="1"/>
+          <p:nvPr/>
+        </p:nvSpPr>
+        <p:spPr>
+          <a:xfrm>
+            <a:off x="7403977" y="2849732"/>
+            <a:ext cx="3719743" cy="369332"/>
+          </a:xfrm>
+          <a:prstGeom prst="rect">
+            <a:avLst/>
+          </a:prstGeom>
+          <a:noFill/>
+        </p:spPr>
+        <p:txBody>
+          <a:bodyPr wrap="square" rtlCol="0">
+            <a:spAutoFit/>
+          </a:bodyPr>
+          <a:lstStyle/>
+          <a:p>
+            <a:r>
+              <a:rPr lang="en-GB" dirty="0"/>
+              <a:t>Example plot?</a:t>
+            </a:r>
+          </a:p>
+        </p:txBody>
+      </p:sp>
+    </p:spTree>
+    <p:extLst>
+      <p:ext uri="{BB962C8B-B14F-4D97-AF65-F5344CB8AC3E}">
+        <p14:creationId xmlns:p14="http://schemas.microsoft.com/office/powerpoint/2010/main" val="1599647569"/>
+      </p:ext>
+    </p:extLst>
+  </p:cSld>
+  <p:clrMapOvr>
+    <a:masterClrMapping/>
+  </p:clrMapOvr>
+</p:sld>
+</file>
+
+<file path=ppt/slides/slide13.xml><?xml version="1.0" encoding="utf-8"?>
+<p:sld xmlns:a="http://schemas.openxmlformats.org/drawingml/2006/main" xmlns:r="http://schemas.openxmlformats.org/officeDocument/2006/relationships" xmlns:p="http://schemas.openxmlformats.org/presentationml/2006/main">
+  <p:cSld>
+    <p:spTree>
+      <p:nvGrpSpPr>
+        <p:cNvPr id="1" name=""/>
+        <p:cNvGrpSpPr/>
+        <p:nvPr/>
+      </p:nvGrpSpPr>
+      <p:grpSpPr>
+        <a:xfrm>
+          <a:off x="0" y="0"/>
+          <a:ext cx="0" cy="0"/>
+          <a:chOff x="0" y="0"/>
+          <a:chExt cx="0" cy="0"/>
+        </a:xfrm>
+      </p:grpSpPr>
+      <p:sp>
+        <p:nvSpPr>
+          <p:cNvPr id="2" name="Title 1">
+            <a:extLst>
+              <a:ext uri="{FF2B5EF4-FFF2-40B4-BE49-F238E27FC236}">
+                <a16:creationId xmlns:a16="http://schemas.microsoft.com/office/drawing/2014/main" id="{9AA72D1C-E43D-43F9-ACF8-D006B2ADD8B9}"/>
+              </a:ext>
+            </a:extLst>
+          </p:cNvPr>
+          <p:cNvSpPr>
+            <a:spLocks noGrp="1"/>
+          </p:cNvSpPr>
+          <p:nvPr>
+            <p:ph type="title"/>
+          </p:nvPr>
+        </p:nvSpPr>
+        <p:spPr/>
+        <p:txBody>
+          <a:bodyPr/>
+          <a:lstStyle/>
+          <a:p>
+            <a:r>
+              <a:rPr lang="en-GB" dirty="0" err="1"/>
+              <a:t>Youla</a:t>
+            </a:r>
+            <a:r>
+              <a:rPr lang="en-GB" dirty="0"/>
+              <a:t> Parameterisation?</a:t>
+            </a:r>
+          </a:p>
+        </p:txBody>
+      </p:sp>
+      <p:sp>
+        <p:nvSpPr>
+          <p:cNvPr id="3" name="Content Placeholder 2">
+            <a:extLst>
+              <a:ext uri="{FF2B5EF4-FFF2-40B4-BE49-F238E27FC236}">
+                <a16:creationId xmlns:a16="http://schemas.microsoft.com/office/drawing/2014/main" id="{93477982-D4BD-4E0E-B2A1-812BDC098E1F}"/>
+              </a:ext>
+            </a:extLst>
+          </p:cNvPr>
+          <p:cNvSpPr>
+            <a:spLocks noGrp="1"/>
+          </p:cNvSpPr>
+          <p:nvPr>
+            <p:ph idx="1"/>
+          </p:nvPr>
+        </p:nvSpPr>
+        <p:spPr/>
+        <p:txBody>
+          <a:bodyPr/>
+          <a:lstStyle/>
+          <a:p>
+            <a:endParaRPr lang="en-GB"/>
+          </a:p>
+        </p:txBody>
+      </p:sp>
+    </p:spTree>
+    <p:extLst>
+      <p:ext uri="{BB962C8B-B14F-4D97-AF65-F5344CB8AC3E}">
+        <p14:creationId xmlns:p14="http://schemas.microsoft.com/office/powerpoint/2010/main" val="21655417"/>
+      </p:ext>
+    </p:extLst>
+  </p:cSld>
+  <p:clrMapOvr>
+    <a:masterClrMapping/>
+  </p:clrMapOvr>
+</p:sld>
+</file>
+
+<file path=ppt/slides/slide14.xml><?xml version="1.0" encoding="utf-8"?>
+<p:sld xmlns:a="http://schemas.openxmlformats.org/drawingml/2006/main" xmlns:r="http://schemas.openxmlformats.org/officeDocument/2006/relationships" xmlns:p="http://schemas.openxmlformats.org/presentationml/2006/main">
+  <p:cSld>
+    <p:spTree>
+      <p:nvGrpSpPr>
+        <p:cNvPr id="1" name=""/>
+        <p:cNvGrpSpPr/>
+        <p:nvPr/>
+      </p:nvGrpSpPr>
+      <p:grpSpPr>
+        <a:xfrm>
+          <a:off x="0" y="0"/>
+          <a:ext cx="0" cy="0"/>
+          <a:chOff x="0" y="0"/>
+          <a:chExt cx="0" cy="0"/>
+        </a:xfrm>
+      </p:grpSpPr>
+      <p:sp>
+        <p:nvSpPr>
+          <p:cNvPr id="2" name="Title 1">
+            <a:extLst>
+              <a:ext uri="{FF2B5EF4-FFF2-40B4-BE49-F238E27FC236}">
+                <a16:creationId xmlns:a16="http://schemas.microsoft.com/office/drawing/2014/main" id="{D6A3863F-F0D6-44F6-9A83-4E2D67439149}"/>
+              </a:ext>
+            </a:extLst>
+          </p:cNvPr>
+          <p:cNvSpPr>
+            <a:spLocks noGrp="1"/>
+          </p:cNvSpPr>
+          <p:nvPr>
+            <p:ph type="title"/>
+          </p:nvPr>
+        </p:nvSpPr>
+        <p:spPr/>
+        <p:txBody>
+          <a:bodyPr/>
+          <a:lstStyle/>
+          <a:p>
+            <a:r>
+              <a:rPr lang="en-GB" dirty="0"/>
+              <a:t>System Level Approach</a:t>
+            </a:r>
+          </a:p>
+        </p:txBody>
+      </p:sp>
+      <p:sp>
+        <p:nvSpPr>
+          <p:cNvPr id="3" name="Content Placeholder 2">
+            <a:extLst>
+              <a:ext uri="{FF2B5EF4-FFF2-40B4-BE49-F238E27FC236}">
+                <a16:creationId xmlns:a16="http://schemas.microsoft.com/office/drawing/2014/main" id="{5968B4A3-E1CB-4A6B-ACF8-BB3D86F26950}"/>
+              </a:ext>
+            </a:extLst>
+          </p:cNvPr>
+          <p:cNvSpPr>
+            <a:spLocks noGrp="1"/>
+          </p:cNvSpPr>
+          <p:nvPr>
+            <p:ph idx="1"/>
+          </p:nvPr>
+        </p:nvSpPr>
+        <p:spPr/>
+        <p:txBody>
+          <a:bodyPr/>
+          <a:lstStyle/>
+          <a:p>
+            <a:endParaRPr lang="en-GB"/>
+          </a:p>
+        </p:txBody>
+      </p:sp>
+    </p:spTree>
+    <p:extLst>
+      <p:ext uri="{BB962C8B-B14F-4D97-AF65-F5344CB8AC3E}">
+        <p14:creationId xmlns:p14="http://schemas.microsoft.com/office/powerpoint/2010/main" val="3059663406"/>
+      </p:ext>
+    </p:extLst>
+  </p:cSld>
+  <p:clrMapOvr>
+    <a:masterClrMapping/>
+  </p:clrMapOvr>
+</p:sld>
+</file>
+
+<file path=ppt/slides/slide15.xml><?xml version="1.0" encoding="utf-8"?>
+<p:sld xmlns:a="http://schemas.openxmlformats.org/drawingml/2006/main" xmlns:r="http://schemas.openxmlformats.org/officeDocument/2006/relationships" xmlns:p="http://schemas.openxmlformats.org/presentationml/2006/main">
+  <p:cSld>
+    <p:spTree>
+      <p:nvGrpSpPr>
+        <p:cNvPr id="1" name=""/>
+        <p:cNvGrpSpPr/>
+        <p:nvPr/>
+      </p:nvGrpSpPr>
+      <p:grpSpPr>
+        <a:xfrm>
+          <a:off x="0" y="0"/>
+          <a:ext cx="0" cy="0"/>
+          <a:chOff x="0" y="0"/>
+          <a:chExt cx="0" cy="0"/>
+        </a:xfrm>
+      </p:grpSpPr>
+      <p:sp>
+        <p:nvSpPr>
+          <p:cNvPr id="2" name="Title 1">
+            <a:extLst>
+              <a:ext uri="{FF2B5EF4-FFF2-40B4-BE49-F238E27FC236}">
+                <a16:creationId xmlns:a16="http://schemas.microsoft.com/office/drawing/2014/main" id="{CF8D22A5-3C15-4B02-8BD1-6DADCA1A0EA6}"/>
+              </a:ext>
+            </a:extLst>
+          </p:cNvPr>
+          <p:cNvSpPr>
+            <a:spLocks noGrp="1"/>
+          </p:cNvSpPr>
+          <p:nvPr>
+            <p:ph type="title"/>
+          </p:nvPr>
+        </p:nvSpPr>
+        <p:spPr/>
+        <p:txBody>
+          <a:bodyPr/>
+          <a:lstStyle/>
+          <a:p>
+            <a:r>
+              <a:rPr lang="en-GB" dirty="0"/>
+              <a:t>Basic Simulation</a:t>
+            </a:r>
+          </a:p>
+        </p:txBody>
+      </p:sp>
+      <p:sp>
+        <p:nvSpPr>
+          <p:cNvPr id="3" name="Content Placeholder 2">
+            <a:extLst>
+              <a:ext uri="{FF2B5EF4-FFF2-40B4-BE49-F238E27FC236}">
+                <a16:creationId xmlns:a16="http://schemas.microsoft.com/office/drawing/2014/main" id="{71602EAF-8007-45A0-9E08-230C7D06EB0B}"/>
+              </a:ext>
+            </a:extLst>
+          </p:cNvPr>
+          <p:cNvSpPr>
+            <a:spLocks noGrp="1"/>
+          </p:cNvSpPr>
+          <p:nvPr>
+            <p:ph idx="1"/>
+          </p:nvPr>
+        </p:nvSpPr>
+        <p:spPr/>
+        <p:txBody>
+          <a:bodyPr/>
+          <a:lstStyle/>
+          <a:p>
+            <a:endParaRPr lang="en-GB"/>
+          </a:p>
+        </p:txBody>
+      </p:sp>
+    </p:spTree>
+    <p:extLst>
+      <p:ext uri="{BB962C8B-B14F-4D97-AF65-F5344CB8AC3E}">
+        <p14:creationId xmlns:p14="http://schemas.microsoft.com/office/powerpoint/2010/main" val="243116075"/>
+      </p:ext>
+    </p:extLst>
+  </p:cSld>
+  <p:clrMapOvr>
+    <a:masterClrMapping/>
+  </p:clrMapOvr>
+</p:sld>
+</file>
+
+<file path=ppt/slides/slide16.xml><?xml version="1.0" encoding="utf-8"?>
+<p:sld xmlns:a="http://schemas.openxmlformats.org/drawingml/2006/main" xmlns:r="http://schemas.openxmlformats.org/officeDocument/2006/relationships" xmlns:p="http://schemas.openxmlformats.org/presentationml/2006/main">
+  <p:cSld>
+    <p:spTree>
+      <p:nvGrpSpPr>
+        <p:cNvPr id="1" name=""/>
+        <p:cNvGrpSpPr/>
+        <p:nvPr/>
+      </p:nvGrpSpPr>
+      <p:grpSpPr>
+        <a:xfrm>
+          <a:off x="0" y="0"/>
+          <a:ext cx="0" cy="0"/>
+          <a:chOff x="0" y="0"/>
+          <a:chExt cx="0" cy="0"/>
+        </a:xfrm>
+      </p:grpSpPr>
+      <p:sp>
+        <p:nvSpPr>
+          <p:cNvPr id="2" name="Title 1">
+            <a:extLst>
+              <a:ext uri="{FF2B5EF4-FFF2-40B4-BE49-F238E27FC236}">
+                <a16:creationId xmlns:a16="http://schemas.microsoft.com/office/drawing/2014/main" id="{6625D631-FEAE-470F-8CBB-FE597626BCE6}"/>
+              </a:ext>
+            </a:extLst>
+          </p:cNvPr>
+          <p:cNvSpPr>
+            <a:spLocks noGrp="1"/>
+          </p:cNvSpPr>
+          <p:nvPr>
+            <p:ph type="title"/>
+          </p:nvPr>
+        </p:nvSpPr>
+        <p:spPr/>
+        <p:txBody>
+          <a:bodyPr/>
+          <a:lstStyle/>
+          <a:p>
+            <a:r>
+              <a:rPr lang="en-GB" dirty="0"/>
+              <a:t>Comparison</a:t>
+            </a:r>
+          </a:p>
+        </p:txBody>
+      </p:sp>
+      <p:sp>
+        <p:nvSpPr>
+          <p:cNvPr id="3" name="Content Placeholder 2">
+            <a:extLst>
+              <a:ext uri="{FF2B5EF4-FFF2-40B4-BE49-F238E27FC236}">
+                <a16:creationId xmlns:a16="http://schemas.microsoft.com/office/drawing/2014/main" id="{612D349C-5B01-4F96-A4B4-BC9FCBA31EA1}"/>
+              </a:ext>
+            </a:extLst>
+          </p:cNvPr>
+          <p:cNvSpPr>
+            <a:spLocks noGrp="1"/>
+          </p:cNvSpPr>
+          <p:nvPr>
+            <p:ph idx="1"/>
+          </p:nvPr>
+        </p:nvSpPr>
+        <p:spPr/>
+        <p:txBody>
+          <a:bodyPr/>
+          <a:lstStyle/>
+          <a:p>
+            <a:endParaRPr lang="en-GB"/>
+          </a:p>
+        </p:txBody>
+      </p:sp>
+    </p:spTree>
+    <p:extLst>
+      <p:ext uri="{BB962C8B-B14F-4D97-AF65-F5344CB8AC3E}">
+        <p14:creationId xmlns:p14="http://schemas.microsoft.com/office/powerpoint/2010/main" val="2521250869"/>
+      </p:ext>
+    </p:extLst>
+  </p:cSld>
+  <p:clrMapOvr>
+    <a:masterClrMapping/>
+  </p:clrMapOvr>
+</p:sld>
+</file>
+
+<file path=ppt/slides/slide17.xml><?xml version="1.0" encoding="utf-8"?>
+<p:sld xmlns:a="http://schemas.openxmlformats.org/drawingml/2006/main" xmlns:r="http://schemas.openxmlformats.org/officeDocument/2006/relationships" xmlns:p="http://schemas.openxmlformats.org/presentationml/2006/main">
+  <p:cSld>
+    <p:spTree>
+      <p:nvGrpSpPr>
+        <p:cNvPr id="1" name=""/>
+        <p:cNvGrpSpPr/>
+        <p:nvPr/>
+      </p:nvGrpSpPr>
+      <p:grpSpPr>
+        <a:xfrm>
+          <a:off x="0" y="0"/>
+          <a:ext cx="0" cy="0"/>
+          <a:chOff x="0" y="0"/>
+          <a:chExt cx="0" cy="0"/>
+        </a:xfrm>
+      </p:grpSpPr>
+      <p:sp>
+        <p:nvSpPr>
+          <p:cNvPr id="2" name="Title 1">
+            <a:extLst>
+              <a:ext uri="{FF2B5EF4-FFF2-40B4-BE49-F238E27FC236}">
+                <a16:creationId xmlns:a16="http://schemas.microsoft.com/office/drawing/2014/main" id="{2E036755-ECC2-477A-AF5A-EC3EC6987C8C}"/>
+              </a:ext>
+            </a:extLst>
+          </p:cNvPr>
+          <p:cNvSpPr>
+            <a:spLocks noGrp="1"/>
+          </p:cNvSpPr>
+          <p:nvPr>
+            <p:ph type="title"/>
+          </p:nvPr>
+        </p:nvSpPr>
+        <p:spPr/>
+        <p:txBody>
+          <a:bodyPr/>
+          <a:lstStyle/>
+          <a:p>
+            <a:r>
+              <a:rPr lang="en-GB" dirty="0"/>
+              <a:t>Conclusions</a:t>
+            </a:r>
+          </a:p>
+        </p:txBody>
+      </p:sp>
+      <p:sp>
+        <p:nvSpPr>
+          <p:cNvPr id="3" name="Content Placeholder 2">
+            <a:extLst>
+              <a:ext uri="{FF2B5EF4-FFF2-40B4-BE49-F238E27FC236}">
+                <a16:creationId xmlns:a16="http://schemas.microsoft.com/office/drawing/2014/main" id="{A57BC6E5-9A40-4672-B05A-31BED3A3CF9C}"/>
+              </a:ext>
+            </a:extLst>
+          </p:cNvPr>
+          <p:cNvSpPr>
+            <a:spLocks noGrp="1"/>
+          </p:cNvSpPr>
+          <p:nvPr>
+            <p:ph idx="1"/>
+          </p:nvPr>
+        </p:nvSpPr>
+        <p:spPr/>
+        <p:txBody>
+          <a:bodyPr/>
+          <a:lstStyle/>
+          <a:p>
+            <a:endParaRPr lang="en-GB"/>
+          </a:p>
+        </p:txBody>
+      </p:sp>
+    </p:spTree>
+    <p:extLst>
+      <p:ext uri="{BB962C8B-B14F-4D97-AF65-F5344CB8AC3E}">
+        <p14:creationId xmlns:p14="http://schemas.microsoft.com/office/powerpoint/2010/main" val="740166718"/>
+      </p:ext>
+    </p:extLst>
+  </p:cSld>
+  <p:clrMapOvr>
+    <a:masterClrMapping/>
+  </p:clrMapOvr>
+</p:sld>
+</file>
+
+<file path=ppt/slides/slide18.xml><?xml version="1.0" encoding="utf-8"?>
+<p:sld xmlns:a="http://schemas.openxmlformats.org/drawingml/2006/main" xmlns:r="http://schemas.openxmlformats.org/officeDocument/2006/relationships" xmlns:p="http://schemas.openxmlformats.org/presentationml/2006/main">
+  <p:cSld>
+    <p:spTree>
+      <p:nvGrpSpPr>
+        <p:cNvPr id="1" name=""/>
+        <p:cNvGrpSpPr/>
+        <p:nvPr/>
+      </p:nvGrpSpPr>
+      <p:grpSpPr>
+        <a:xfrm>
+          <a:off x="0" y="0"/>
+          <a:ext cx="0" cy="0"/>
+          <a:chOff x="0" y="0"/>
+          <a:chExt cx="0" cy="0"/>
+        </a:xfrm>
+      </p:grpSpPr>
       <p:sp>
         <p:nvSpPr>
           <p:cNvPr id="2" name="Title 1">
@@ -5556,7 +6494,7 @@
           <a:p>
             <a:r>
               <a:rPr lang="en-GB" dirty="0"/>
-              <a:t>Breaking down the problem</a:t>
+              <a:t>Dynamical Systems</a:t>
             </a:r>
           </a:p>
         </p:txBody>
@@ -5577,12 +6515,33 @@
             <p:ph idx="1"/>
           </p:nvPr>
         </p:nvSpPr>
-        <p:spPr/>
-        <p:txBody>
-          <a:bodyPr/>
-          <a:lstStyle/>
-          <a:p>
-            <a:endParaRPr lang="en-GB"/>
+        <p:spPr>
+          <a:xfrm>
+            <a:off x="818712" y="2222287"/>
+            <a:ext cx="3353793" cy="3636511"/>
+          </a:xfrm>
+        </p:spPr>
+        <p:txBody>
+          <a:bodyPr>
+            <a:normAutofit/>
+          </a:bodyPr>
+          <a:lstStyle/>
+          <a:p>
+            <a:pPr marL="0" indent="0" algn="ctr">
+              <a:buNone/>
+            </a:pPr>
+            <a:r>
+              <a:rPr lang="en-GB" sz="3200" dirty="0"/>
+              <a:t>x[k+1] = </a:t>
+            </a:r>
+            <a:r>
+              <a:rPr lang="en-GB" sz="3200" dirty="0" err="1"/>
+              <a:t>Ax</a:t>
+            </a:r>
+            <a:r>
+              <a:rPr lang="en-GB" sz="3200" dirty="0"/>
+              <a:t>[k]</a:t>
+            </a:r>
           </a:p>
         </p:txBody>
       </p:sp>
@@ -5621,7 +6580,7 @@
           <p:cNvPr id="2" name="Title 1">
             <a:extLst>
               <a:ext uri="{FF2B5EF4-FFF2-40B4-BE49-F238E27FC236}">
-                <a16:creationId xmlns:a16="http://schemas.microsoft.com/office/drawing/2014/main" id="{B3727FEA-138A-44E1-8EBD-F5FE3E8D75E1}"/>
+                <a16:creationId xmlns:a16="http://schemas.microsoft.com/office/drawing/2014/main" id="{76748DC8-F1C7-426B-B68B-1E69A1AA7D23}"/>
               </a:ext>
             </a:extLst>
           </p:cNvPr>
@@ -5639,7 +6598,7 @@
           <a:p>
             <a:r>
               <a:rPr lang="en-GB" dirty="0"/>
-              <a:t>Dynamical System</a:t>
+              <a:t>Dynamical Systems</a:t>
             </a:r>
           </a:p>
         </p:txBody>
@@ -5649,7 +6608,7 @@
           <p:cNvPr id="3" name="Content Placeholder 2">
             <a:extLst>
               <a:ext uri="{FF2B5EF4-FFF2-40B4-BE49-F238E27FC236}">
-                <a16:creationId xmlns:a16="http://schemas.microsoft.com/office/drawing/2014/main" id="{E26BCBA4-8469-4E3A-8E6E-3A1E8D7C0E50}"/>
+                <a16:creationId xmlns:a16="http://schemas.microsoft.com/office/drawing/2014/main" id="{F5446691-AB2B-4CC3-8C1F-9EF67192E9DD}"/>
               </a:ext>
             </a:extLst>
           </p:cNvPr>
@@ -5660,19 +6619,73 @@
             <p:ph idx="1"/>
           </p:nvPr>
         </p:nvSpPr>
-        <p:spPr/>
-        <p:txBody>
-          <a:bodyPr/>
-          <a:lstStyle/>
-          <a:p>
-            <a:endParaRPr lang="en-GB"/>
+        <p:spPr>
+          <a:xfrm>
+            <a:off x="818712" y="2222287"/>
+            <a:ext cx="3353793" cy="3636511"/>
+          </a:xfrm>
+        </p:spPr>
+        <p:txBody>
+          <a:bodyPr>
+            <a:normAutofit/>
+          </a:bodyPr>
+          <a:lstStyle/>
+          <a:p>
+            <a:pPr marL="0" indent="0" algn="ctr">
+              <a:buNone/>
+            </a:pPr>
+            <a:r>
+              <a:rPr lang="en-GB" sz="3200" dirty="0"/>
+              <a:t>x[k+1] = </a:t>
+            </a:r>
+            <a:r>
+              <a:rPr lang="en-GB" sz="3200" dirty="0" err="1"/>
+              <a:t>Ax</a:t>
+            </a:r>
+            <a:r>
+              <a:rPr lang="en-GB" sz="3200" dirty="0"/>
+              <a:t>[k]</a:t>
+            </a:r>
+          </a:p>
+          <a:p>
+            <a:pPr marL="0" indent="0" algn="ctr">
+              <a:buNone/>
+            </a:pPr>
+            <a:r>
+              <a:rPr lang="en-GB" sz="3200" dirty="0"/>
+              <a:t>OR</a:t>
+            </a:r>
+          </a:p>
+          <a:p>
+            <a:pPr marL="0" indent="0" algn="ctr">
+              <a:buNone/>
+            </a:pPr>
+            <a:r>
+              <a:rPr lang="en-GB" sz="3200" dirty="0"/>
+              <a:t>x</a:t>
+            </a:r>
+            <a:r>
+              <a:rPr lang="en-GB" sz="3200" dirty="0">
+                <a:latin typeface="Calibri" panose="020F0502020204030204" pitchFamily="34" charset="0"/>
+                <a:cs typeface="Calibri" panose="020F0502020204030204" pitchFamily="34" charset="0"/>
+              </a:rPr>
+              <a:t>̊ = </a:t>
+            </a:r>
+            <a:r>
+              <a:rPr lang="en-GB" sz="3200" dirty="0" err="1">
+                <a:latin typeface="Calibri" panose="020F0502020204030204" pitchFamily="34" charset="0"/>
+                <a:cs typeface="Calibri" panose="020F0502020204030204" pitchFamily="34" charset="0"/>
+              </a:rPr>
+              <a:t>Ax</a:t>
+            </a:r>
+            <a:endParaRPr lang="en-GB" sz="3200" dirty="0"/>
           </a:p>
         </p:txBody>
       </p:sp>
     </p:spTree>
     <p:extLst>
       <p:ext uri="{BB962C8B-B14F-4D97-AF65-F5344CB8AC3E}">
-        <p14:creationId xmlns:p14="http://schemas.microsoft.com/office/powerpoint/2010/main" val="4133701527"/>
+        <p14:creationId xmlns:p14="http://schemas.microsoft.com/office/powerpoint/2010/main" val="843199329"/>
       </p:ext>
     </p:extLst>
   </p:cSld>
@@ -5704,7 +6717,7 @@
           <p:cNvPr id="2" name="Title 1">
             <a:extLst>
               <a:ext uri="{FF2B5EF4-FFF2-40B4-BE49-F238E27FC236}">
-                <a16:creationId xmlns:a16="http://schemas.microsoft.com/office/drawing/2014/main" id="{CEFFBE9A-AC74-42D1-AE95-39F7E9702368}"/>
+                <a16:creationId xmlns:a16="http://schemas.microsoft.com/office/drawing/2014/main" id="{76748DC8-F1C7-426B-B68B-1E69A1AA7D23}"/>
               </a:ext>
             </a:extLst>
           </p:cNvPr>
@@ -5722,7 +6735,7 @@
           <a:p>
             <a:r>
               <a:rPr lang="en-GB" dirty="0"/>
-              <a:t>Control</a:t>
+              <a:t>Simple Pendulum</a:t>
             </a:r>
           </a:p>
         </p:txBody>
@@ -5732,7 +6745,7 @@
           <p:cNvPr id="3" name="Content Placeholder 2">
             <a:extLst>
               <a:ext uri="{FF2B5EF4-FFF2-40B4-BE49-F238E27FC236}">
-                <a16:creationId xmlns:a16="http://schemas.microsoft.com/office/drawing/2014/main" id="{1738361B-5137-44FF-9953-A99248C2B253}"/>
+                <a16:creationId xmlns:a16="http://schemas.microsoft.com/office/drawing/2014/main" id="{F5446691-AB2B-4CC3-8C1F-9EF67192E9DD}"/>
               </a:ext>
             </a:extLst>
           </p:cNvPr>
@@ -5743,19 +6756,112 @@
             <p:ph idx="1"/>
           </p:nvPr>
         </p:nvSpPr>
-        <p:spPr/>
-        <p:txBody>
-          <a:bodyPr/>
-          <a:lstStyle/>
-          <a:p>
-            <a:endParaRPr lang="en-GB"/>
-          </a:p>
-        </p:txBody>
-      </p:sp>
+        <p:spPr>
+          <a:xfrm>
+            <a:off x="818712" y="2222287"/>
+            <a:ext cx="3353793" cy="3636511"/>
+          </a:xfrm>
+        </p:spPr>
+        <p:txBody>
+          <a:bodyPr>
+            <a:normAutofit/>
+          </a:bodyPr>
+          <a:lstStyle/>
+          <a:p>
+            <a:pPr marL="0" indent="0" algn="ctr">
+              <a:buNone/>
+            </a:pPr>
+            <a:r>
+              <a:rPr lang="en-GB" sz="3200" dirty="0"/>
+              <a:t>x[k+1] = </a:t>
+            </a:r>
+            <a:r>
+              <a:rPr lang="en-GB" sz="3200" dirty="0" err="1"/>
+              <a:t>Ax</a:t>
+            </a:r>
+            <a:r>
+              <a:rPr lang="en-GB" sz="3200" dirty="0"/>
+              <a:t>[k]</a:t>
+            </a:r>
+          </a:p>
+          <a:p>
+            <a:pPr marL="0" indent="0" algn="ctr">
+              <a:buNone/>
+            </a:pPr>
+            <a:r>
+              <a:rPr lang="en-GB" sz="3200" dirty="0"/>
+              <a:t>OR</a:t>
+            </a:r>
+          </a:p>
+          <a:p>
+            <a:pPr marL="0" indent="0" algn="ctr">
+              <a:buNone/>
+            </a:pPr>
+            <a:r>
+              <a:rPr lang="en-GB" sz="3200" dirty="0"/>
+              <a:t>x</a:t>
+            </a:r>
+            <a:r>
+              <a:rPr lang="en-GB" sz="3200" dirty="0">
+                <a:latin typeface="Calibri" panose="020F0502020204030204" pitchFamily="34" charset="0"/>
+                <a:cs typeface="Calibri" panose="020F0502020204030204" pitchFamily="34" charset="0"/>
+              </a:rPr>
+              <a:t>̊ = </a:t>
+            </a:r>
+            <a:r>
+              <a:rPr lang="en-GB" sz="3200" dirty="0" err="1">
+                <a:latin typeface="Calibri" panose="020F0502020204030204" pitchFamily="34" charset="0"/>
+                <a:cs typeface="Calibri" panose="020F0502020204030204" pitchFamily="34" charset="0"/>
+              </a:rPr>
+              <a:t>Ax</a:t>
+            </a:r>
+            <a:endParaRPr lang="en-GB" sz="3200" dirty="0">
+              <a:latin typeface="Calibri" panose="020F0502020204030204" pitchFamily="34" charset="0"/>
+              <a:cs typeface="Calibri" panose="020F0502020204030204" pitchFamily="34" charset="0"/>
+            </a:endParaRPr>
+          </a:p>
+        </p:txBody>
+      </p:sp>
+      <p:pic>
+        <p:nvPicPr>
+          <p:cNvPr id="8" name="Graphic 7">
+            <a:extLst>
+              <a:ext uri="{FF2B5EF4-FFF2-40B4-BE49-F238E27FC236}">
+                <a16:creationId xmlns:a16="http://schemas.microsoft.com/office/drawing/2014/main" id="{C5426A50-B637-4272-A90B-72278B8D3CAB}"/>
+              </a:ext>
+            </a:extLst>
+          </p:cNvPr>
+          <p:cNvPicPr>
+            <a:picLocks noChangeAspect="1"/>
+          </p:cNvPicPr>
+          <p:nvPr/>
+        </p:nvPicPr>
+        <p:blipFill>
+          <a:blip r:embed="rId2">
+            <a:extLst>
+              <a:ext uri="{96DAC541-7B7A-43D3-8B79-37D633B846F1}">
+                <asvg:svgBlip xmlns:asvg="http://schemas.microsoft.com/office/drawing/2016/SVG/main" r:embed="rId3"/>
+              </a:ext>
+            </a:extLst>
+          </a:blip>
+          <a:stretch>
+            <a:fillRect/>
+          </a:stretch>
+        </p:blipFill>
+        <p:spPr>
+          <a:xfrm>
+            <a:off x="5514598" y="2843212"/>
+            <a:ext cx="5867400" cy="3171825"/>
+          </a:xfrm>
+          <a:prstGeom prst="rect">
+            <a:avLst/>
+          </a:prstGeom>
+        </p:spPr>
+      </p:pic>
     </p:spTree>
     <p:extLst>
       <p:ext uri="{BB962C8B-B14F-4D97-AF65-F5344CB8AC3E}">
-        <p14:creationId xmlns:p14="http://schemas.microsoft.com/office/powerpoint/2010/main" val="3979683690"/>
+        <p14:creationId xmlns:p14="http://schemas.microsoft.com/office/powerpoint/2010/main" val="3841518924"/>
       </p:ext>
     </p:extLst>
   </p:cSld>
@@ -5787,7 +6893,7 @@
           <p:cNvPr id="2" name="Title 1">
             <a:extLst>
               <a:ext uri="{FF2B5EF4-FFF2-40B4-BE49-F238E27FC236}">
-                <a16:creationId xmlns:a16="http://schemas.microsoft.com/office/drawing/2014/main" id="{9AA72D1C-E43D-43F9-ACF8-D006B2ADD8B9}"/>
+                <a16:creationId xmlns:a16="http://schemas.microsoft.com/office/drawing/2014/main" id="{76748DC8-F1C7-426B-B68B-1E69A1AA7D23}"/>
               </a:ext>
             </a:extLst>
           </p:cNvPr>
@@ -5804,12 +6910,8 @@
           <a:lstStyle/>
           <a:p>
             <a:r>
-              <a:rPr lang="en-GB" dirty="0" err="1"/>
-              <a:t>Youla</a:t>
-            </a:r>
-            <a:r>
               <a:rPr lang="en-GB" dirty="0"/>
-              <a:t> Parameterisation?</a:t>
+              <a:t>Simple Pendulum</a:t>
             </a:r>
           </a:p>
         </p:txBody>
@@ -5819,7 +6921,7 @@
           <p:cNvPr id="3" name="Content Placeholder 2">
             <a:extLst>
               <a:ext uri="{FF2B5EF4-FFF2-40B4-BE49-F238E27FC236}">
-                <a16:creationId xmlns:a16="http://schemas.microsoft.com/office/drawing/2014/main" id="{93477982-D4BD-4E0E-B2A1-812BDC098E1F}"/>
+                <a16:creationId xmlns:a16="http://schemas.microsoft.com/office/drawing/2014/main" id="{F5446691-AB2B-4CC3-8C1F-9EF67192E9DD}"/>
               </a:ext>
             </a:extLst>
           </p:cNvPr>
@@ -5830,19 +6932,185 @@
             <p:ph idx="1"/>
           </p:nvPr>
         </p:nvSpPr>
-        <p:spPr/>
-        <p:txBody>
-          <a:bodyPr/>
-          <a:lstStyle/>
-          <a:p>
-            <a:endParaRPr lang="en-GB"/>
-          </a:p>
-        </p:txBody>
-      </p:sp>
+        <p:spPr>
+          <a:xfrm>
+            <a:off x="499115" y="2275553"/>
+            <a:ext cx="3753288" cy="3636511"/>
+          </a:xfrm>
+        </p:spPr>
+        <p:txBody>
+          <a:bodyPr>
+            <a:normAutofit/>
+          </a:bodyPr>
+          <a:lstStyle/>
+          <a:p>
+            <a:pPr marL="0" indent="0" algn="ctr">
+              <a:buNone/>
+            </a:pPr>
+            <a:r>
+              <a:rPr lang="en-GB" sz="3200" dirty="0">
+                <a:latin typeface="Calibri" panose="020F0502020204030204" pitchFamily="34" charset="0"/>
+                <a:cs typeface="Calibri" panose="020F0502020204030204" pitchFamily="34" charset="0"/>
+              </a:rPr>
+              <a:t>d</a:t>
+            </a:r>
+            <a:r>
+              <a:rPr lang="el-GR" sz="3200" dirty="0">
+                <a:latin typeface="Calibri" panose="020F0502020204030204" pitchFamily="34" charset="0"/>
+                <a:cs typeface="Calibri" panose="020F0502020204030204" pitchFamily="34" charset="0"/>
+              </a:rPr>
+              <a:t>θ</a:t>
+            </a:r>
+            <a:r>
+              <a:rPr lang="en-GB" sz="3200" dirty="0">
+                <a:latin typeface="Calibri" panose="020F0502020204030204" pitchFamily="34" charset="0"/>
+                <a:cs typeface="Calibri" panose="020F0502020204030204" pitchFamily="34" charset="0"/>
+              </a:rPr>
+              <a:t>/</a:t>
+            </a:r>
+            <a:r>
+              <a:rPr lang="en-GB" sz="3200" dirty="0" err="1">
+                <a:latin typeface="Calibri" panose="020F0502020204030204" pitchFamily="34" charset="0"/>
+                <a:cs typeface="Calibri" panose="020F0502020204030204" pitchFamily="34" charset="0"/>
+              </a:rPr>
+              <a:t>dt</a:t>
+            </a:r>
+            <a:r>
+              <a:rPr lang="en-GB" sz="3200" dirty="0">
+                <a:latin typeface="Calibri" panose="020F0502020204030204" pitchFamily="34" charset="0"/>
+                <a:cs typeface="Calibri" panose="020F0502020204030204" pitchFamily="34" charset="0"/>
+              </a:rPr>
+              <a:t> = </a:t>
+            </a:r>
+            <a:r>
+              <a:rPr lang="el-GR" sz="3200" dirty="0">
+                <a:latin typeface="Calibri" panose="020F0502020204030204" pitchFamily="34" charset="0"/>
+                <a:cs typeface="Calibri" panose="020F0502020204030204" pitchFamily="34" charset="0"/>
+              </a:rPr>
+              <a:t>ω</a:t>
+            </a:r>
+            <a:r>
+              <a:rPr lang="en-GB" sz="3200" dirty="0">
+                <a:latin typeface="Calibri" panose="020F0502020204030204" pitchFamily="34" charset="0"/>
+                <a:cs typeface="Calibri" panose="020F0502020204030204" pitchFamily="34" charset="0"/>
+              </a:rPr>
+              <a:t> </a:t>
+            </a:r>
+          </a:p>
+          <a:p>
+            <a:pPr marL="0" indent="0" algn="ctr">
+              <a:buNone/>
+            </a:pPr>
+            <a:r>
+              <a:rPr lang="en-GB" sz="3200" dirty="0">
+                <a:latin typeface="Calibri" panose="020F0502020204030204" pitchFamily="34" charset="0"/>
+                <a:cs typeface="Calibri" panose="020F0502020204030204" pitchFamily="34" charset="0"/>
+              </a:rPr>
+              <a:t>d</a:t>
+            </a:r>
+            <a:r>
+              <a:rPr lang="el-GR" sz="3200" dirty="0">
+                <a:latin typeface="Calibri" panose="020F0502020204030204" pitchFamily="34" charset="0"/>
+                <a:cs typeface="Calibri" panose="020F0502020204030204" pitchFamily="34" charset="0"/>
+              </a:rPr>
+              <a:t>ω</a:t>
+            </a:r>
+            <a:r>
+              <a:rPr lang="en-GB" sz="3200" dirty="0">
+                <a:latin typeface="Calibri" panose="020F0502020204030204" pitchFamily="34" charset="0"/>
+                <a:cs typeface="Calibri" panose="020F0502020204030204" pitchFamily="34" charset="0"/>
+              </a:rPr>
+              <a:t>/</a:t>
+            </a:r>
+            <a:r>
+              <a:rPr lang="en-GB" sz="3200" dirty="0" err="1">
+                <a:latin typeface="Calibri" panose="020F0502020204030204" pitchFamily="34" charset="0"/>
+                <a:cs typeface="Calibri" panose="020F0502020204030204" pitchFamily="34" charset="0"/>
+              </a:rPr>
+              <a:t>dt</a:t>
+            </a:r>
+            <a:r>
+              <a:rPr lang="en-GB" sz="3200" dirty="0">
+                <a:latin typeface="Calibri" panose="020F0502020204030204" pitchFamily="34" charset="0"/>
+                <a:cs typeface="Calibri" panose="020F0502020204030204" pitchFamily="34" charset="0"/>
+              </a:rPr>
+              <a:t> =  </a:t>
+            </a:r>
+            <a:r>
+              <a:rPr lang="el-GR" sz="3200" dirty="0">
+                <a:latin typeface="Calibri" panose="020F0502020204030204" pitchFamily="34" charset="0"/>
+                <a:cs typeface="Calibri" panose="020F0502020204030204" pitchFamily="34" charset="0"/>
+              </a:rPr>
+              <a:t>γω</a:t>
+            </a:r>
+            <a:r>
+              <a:rPr lang="en-GB" sz="3200" dirty="0">
+                <a:latin typeface="Calibri" panose="020F0502020204030204" pitchFamily="34" charset="0"/>
+                <a:cs typeface="Calibri" panose="020F0502020204030204" pitchFamily="34" charset="0"/>
+              </a:rPr>
+              <a:t> - </a:t>
+            </a:r>
+            <a:r>
+              <a:rPr lang="en-GB" sz="3200" dirty="0" err="1">
+                <a:latin typeface="Calibri" panose="020F0502020204030204" pitchFamily="34" charset="0"/>
+                <a:cs typeface="Calibri" panose="020F0502020204030204" pitchFamily="34" charset="0"/>
+              </a:rPr>
+              <a:t>mgsin</a:t>
+            </a:r>
+            <a:r>
+              <a:rPr lang="el-GR" sz="3200" dirty="0">
+                <a:latin typeface="Calibri" panose="020F0502020204030204" pitchFamily="34" charset="0"/>
+                <a:cs typeface="Calibri" panose="020F0502020204030204" pitchFamily="34" charset="0"/>
+              </a:rPr>
+              <a:t>θ</a:t>
+            </a:r>
+            <a:endParaRPr lang="en-GB" sz="3200" dirty="0">
+              <a:latin typeface="Calibri" panose="020F0502020204030204" pitchFamily="34" charset="0"/>
+              <a:cs typeface="Calibri" panose="020F0502020204030204" pitchFamily="34" charset="0"/>
+            </a:endParaRPr>
+          </a:p>
+        </p:txBody>
+      </p:sp>
+      <p:pic>
+        <p:nvPicPr>
+          <p:cNvPr id="8" name="Graphic 7">
+            <a:extLst>
+              <a:ext uri="{FF2B5EF4-FFF2-40B4-BE49-F238E27FC236}">
+                <a16:creationId xmlns:a16="http://schemas.microsoft.com/office/drawing/2014/main" id="{C5426A50-B637-4272-A90B-72278B8D3CAB}"/>
+              </a:ext>
+            </a:extLst>
+          </p:cNvPr>
+          <p:cNvPicPr>
+            <a:picLocks noChangeAspect="1"/>
+          </p:cNvPicPr>
+          <p:nvPr/>
+        </p:nvPicPr>
+        <p:blipFill>
+          <a:blip r:embed="rId2">
+            <a:extLst>
+              <a:ext uri="{96DAC541-7B7A-43D3-8B79-37D633B846F1}">
+                <asvg:svgBlip xmlns:asvg="http://schemas.microsoft.com/office/drawing/2016/SVG/main" r:embed="rId3"/>
+              </a:ext>
+            </a:extLst>
+          </a:blip>
+          <a:stretch>
+            <a:fillRect/>
+          </a:stretch>
+        </p:blipFill>
+        <p:spPr>
+          <a:xfrm>
+            <a:off x="5514598" y="2843212"/>
+            <a:ext cx="5867400" cy="3171825"/>
+          </a:xfrm>
+          <a:prstGeom prst="rect">
+            <a:avLst/>
+          </a:prstGeom>
+        </p:spPr>
+      </p:pic>
     </p:spTree>
     <p:extLst>
       <p:ext uri="{BB962C8B-B14F-4D97-AF65-F5344CB8AC3E}">
-        <p14:creationId xmlns:p14="http://schemas.microsoft.com/office/powerpoint/2010/main" val="21655417"/>
+        <p14:creationId xmlns:p14="http://schemas.microsoft.com/office/powerpoint/2010/main" val="2421719344"/>
       </p:ext>
     </p:extLst>
   </p:cSld>
@@ -5874,7 +7142,7 @@
           <p:cNvPr id="2" name="Title 1">
             <a:extLst>
               <a:ext uri="{FF2B5EF4-FFF2-40B4-BE49-F238E27FC236}">
-                <a16:creationId xmlns:a16="http://schemas.microsoft.com/office/drawing/2014/main" id="{D6A3863F-F0D6-44F6-9A83-4E2D67439149}"/>
+                <a16:creationId xmlns:a16="http://schemas.microsoft.com/office/drawing/2014/main" id="{76748DC8-F1C7-426B-B68B-1E69A1AA7D23}"/>
               </a:ext>
             </a:extLst>
           </p:cNvPr>
@@ -5892,7 +7160,7 @@
           <a:p>
             <a:r>
               <a:rPr lang="en-GB" dirty="0"/>
-              <a:t>System Level Approach</a:t>
+              <a:t>Simple Pendulum</a:t>
             </a:r>
           </a:p>
         </p:txBody>
@@ -5902,7 +7170,7 @@
           <p:cNvPr id="3" name="Content Placeholder 2">
             <a:extLst>
               <a:ext uri="{FF2B5EF4-FFF2-40B4-BE49-F238E27FC236}">
-                <a16:creationId xmlns:a16="http://schemas.microsoft.com/office/drawing/2014/main" id="{5968B4A3-E1CB-4A6B-ACF8-BB3D86F26950}"/>
+                <a16:creationId xmlns:a16="http://schemas.microsoft.com/office/drawing/2014/main" id="{F5446691-AB2B-4CC3-8C1F-9EF67192E9DD}"/>
               </a:ext>
             </a:extLst>
           </p:cNvPr>
@@ -5913,19 +7181,178 @@
             <p:ph idx="1"/>
           </p:nvPr>
         </p:nvSpPr>
-        <p:spPr/>
-        <p:txBody>
-          <a:bodyPr/>
-          <a:lstStyle/>
-          <a:p>
-            <a:endParaRPr lang="en-GB"/>
-          </a:p>
-        </p:txBody>
-      </p:sp>
+        <p:spPr>
+          <a:xfrm>
+            <a:off x="499115" y="2275553"/>
+            <a:ext cx="3753288" cy="3636511"/>
+          </a:xfrm>
+        </p:spPr>
+        <p:txBody>
+          <a:bodyPr>
+            <a:normAutofit/>
+          </a:bodyPr>
+          <a:lstStyle/>
+          <a:p>
+            <a:pPr marL="0" indent="0" algn="ctr">
+              <a:buNone/>
+            </a:pPr>
+            <a:r>
+              <a:rPr lang="en-GB" sz="3200" dirty="0">
+                <a:latin typeface="Calibri" panose="020F0502020204030204" pitchFamily="34" charset="0"/>
+                <a:cs typeface="Calibri" panose="020F0502020204030204" pitchFamily="34" charset="0"/>
+              </a:rPr>
+              <a:t>d</a:t>
+            </a:r>
+            <a:r>
+              <a:rPr lang="el-GR" sz="3200" dirty="0">
+                <a:latin typeface="Calibri" panose="020F0502020204030204" pitchFamily="34" charset="0"/>
+                <a:cs typeface="Calibri" panose="020F0502020204030204" pitchFamily="34" charset="0"/>
+              </a:rPr>
+              <a:t>θ</a:t>
+            </a:r>
+            <a:r>
+              <a:rPr lang="en-GB" sz="3200" dirty="0">
+                <a:latin typeface="Calibri" panose="020F0502020204030204" pitchFamily="34" charset="0"/>
+                <a:cs typeface="Calibri" panose="020F0502020204030204" pitchFamily="34" charset="0"/>
+              </a:rPr>
+              <a:t>/</a:t>
+            </a:r>
+            <a:r>
+              <a:rPr lang="en-GB" sz="3200" dirty="0" err="1">
+                <a:latin typeface="Calibri" panose="020F0502020204030204" pitchFamily="34" charset="0"/>
+                <a:cs typeface="Calibri" panose="020F0502020204030204" pitchFamily="34" charset="0"/>
+              </a:rPr>
+              <a:t>dt</a:t>
+            </a:r>
+            <a:r>
+              <a:rPr lang="en-GB" sz="3200" dirty="0">
+                <a:latin typeface="Calibri" panose="020F0502020204030204" pitchFamily="34" charset="0"/>
+                <a:cs typeface="Calibri" panose="020F0502020204030204" pitchFamily="34" charset="0"/>
+              </a:rPr>
+              <a:t> = </a:t>
+            </a:r>
+            <a:r>
+              <a:rPr lang="el-GR" sz="3200" dirty="0">
+                <a:latin typeface="Calibri" panose="020F0502020204030204" pitchFamily="34" charset="0"/>
+                <a:cs typeface="Calibri" panose="020F0502020204030204" pitchFamily="34" charset="0"/>
+              </a:rPr>
+              <a:t>ω</a:t>
+            </a:r>
+            <a:r>
+              <a:rPr lang="en-GB" sz="3200" dirty="0">
+                <a:latin typeface="Calibri" panose="020F0502020204030204" pitchFamily="34" charset="0"/>
+                <a:cs typeface="Calibri" panose="020F0502020204030204" pitchFamily="34" charset="0"/>
+              </a:rPr>
+              <a:t> </a:t>
+            </a:r>
+          </a:p>
+          <a:p>
+            <a:pPr marL="0" indent="0" algn="ctr">
+              <a:buNone/>
+            </a:pPr>
+            <a:r>
+              <a:rPr lang="en-GB" sz="3200" dirty="0">
+                <a:latin typeface="Calibri" panose="020F0502020204030204" pitchFamily="34" charset="0"/>
+                <a:cs typeface="Calibri" panose="020F0502020204030204" pitchFamily="34" charset="0"/>
+              </a:rPr>
+              <a:t>d</a:t>
+            </a:r>
+            <a:r>
+              <a:rPr lang="el-GR" sz="3200" dirty="0">
+                <a:latin typeface="Calibri" panose="020F0502020204030204" pitchFamily="34" charset="0"/>
+                <a:cs typeface="Calibri" panose="020F0502020204030204" pitchFamily="34" charset="0"/>
+              </a:rPr>
+              <a:t>ω</a:t>
+            </a:r>
+            <a:r>
+              <a:rPr lang="en-GB" sz="3200" dirty="0">
+                <a:latin typeface="Calibri" panose="020F0502020204030204" pitchFamily="34" charset="0"/>
+                <a:cs typeface="Calibri" panose="020F0502020204030204" pitchFamily="34" charset="0"/>
+              </a:rPr>
+              <a:t>/</a:t>
+            </a:r>
+            <a:r>
+              <a:rPr lang="en-GB" sz="3200" dirty="0" err="1">
+                <a:latin typeface="Calibri" panose="020F0502020204030204" pitchFamily="34" charset="0"/>
+                <a:cs typeface="Calibri" panose="020F0502020204030204" pitchFamily="34" charset="0"/>
+              </a:rPr>
+              <a:t>dt</a:t>
+            </a:r>
+            <a:r>
+              <a:rPr lang="en-GB" sz="3200" dirty="0">
+                <a:latin typeface="Calibri" panose="020F0502020204030204" pitchFamily="34" charset="0"/>
+                <a:cs typeface="Calibri" panose="020F0502020204030204" pitchFamily="34" charset="0"/>
+              </a:rPr>
+              <a:t> =  </a:t>
+            </a:r>
+            <a:r>
+              <a:rPr lang="el-GR" sz="3200" dirty="0">
+                <a:latin typeface="Calibri" panose="020F0502020204030204" pitchFamily="34" charset="0"/>
+                <a:cs typeface="Calibri" panose="020F0502020204030204" pitchFamily="34" charset="0"/>
+              </a:rPr>
+              <a:t>γω</a:t>
+            </a:r>
+            <a:r>
+              <a:rPr lang="en-GB" sz="3200" dirty="0">
+                <a:latin typeface="Calibri" panose="020F0502020204030204" pitchFamily="34" charset="0"/>
+                <a:cs typeface="Calibri" panose="020F0502020204030204" pitchFamily="34" charset="0"/>
+              </a:rPr>
+              <a:t> - mg</a:t>
+            </a:r>
+            <a:r>
+              <a:rPr lang="el-GR" sz="3200" dirty="0">
+                <a:latin typeface="Calibri" panose="020F0502020204030204" pitchFamily="34" charset="0"/>
+                <a:cs typeface="Calibri" panose="020F0502020204030204" pitchFamily="34" charset="0"/>
+              </a:rPr>
+              <a:t>θ</a:t>
+            </a:r>
+            <a:endParaRPr lang="en-GB" sz="3200" dirty="0">
+              <a:latin typeface="Calibri" panose="020F0502020204030204" pitchFamily="34" charset="0"/>
+              <a:cs typeface="Calibri" panose="020F0502020204030204" pitchFamily="34" charset="0"/>
+            </a:endParaRPr>
+          </a:p>
+        </p:txBody>
+      </p:sp>
+      <p:pic>
+        <p:nvPicPr>
+          <p:cNvPr id="8" name="Graphic 7">
+            <a:extLst>
+              <a:ext uri="{FF2B5EF4-FFF2-40B4-BE49-F238E27FC236}">
+                <a16:creationId xmlns:a16="http://schemas.microsoft.com/office/drawing/2014/main" id="{C5426A50-B637-4272-A90B-72278B8D3CAB}"/>
+              </a:ext>
+            </a:extLst>
+          </p:cNvPr>
+          <p:cNvPicPr>
+            <a:picLocks noChangeAspect="1"/>
+          </p:cNvPicPr>
+          <p:nvPr/>
+        </p:nvPicPr>
+        <p:blipFill>
+          <a:blip r:embed="rId2">
+            <a:extLst>
+              <a:ext uri="{96DAC541-7B7A-43D3-8B79-37D633B846F1}">
+                <asvg:svgBlip xmlns:asvg="http://schemas.microsoft.com/office/drawing/2016/SVG/main" r:embed="rId3"/>
+              </a:ext>
+            </a:extLst>
+          </a:blip>
+          <a:stretch>
+            <a:fillRect/>
+          </a:stretch>
+        </p:blipFill>
+        <p:spPr>
+          <a:xfrm>
+            <a:off x="5514598" y="2843212"/>
+            <a:ext cx="5867400" cy="3171825"/>
+          </a:xfrm>
+          <a:prstGeom prst="rect">
+            <a:avLst/>
+          </a:prstGeom>
+        </p:spPr>
+      </p:pic>
     </p:spTree>
     <p:extLst>
       <p:ext uri="{BB962C8B-B14F-4D97-AF65-F5344CB8AC3E}">
-        <p14:creationId xmlns:p14="http://schemas.microsoft.com/office/powerpoint/2010/main" val="3059663406"/>
+        <p14:creationId xmlns:p14="http://schemas.microsoft.com/office/powerpoint/2010/main" val="3157764016"/>
       </p:ext>
     </p:extLst>
   </p:cSld>
@@ -5957,7 +7384,7 @@
           <p:cNvPr id="2" name="Title 1">
             <a:extLst>
               <a:ext uri="{FF2B5EF4-FFF2-40B4-BE49-F238E27FC236}">
-                <a16:creationId xmlns:a16="http://schemas.microsoft.com/office/drawing/2014/main" id="{CF8D22A5-3C15-4B02-8BD1-6DADCA1A0EA6}"/>
+                <a16:creationId xmlns:a16="http://schemas.microsoft.com/office/drawing/2014/main" id="{76748DC8-F1C7-426B-B68B-1E69A1AA7D23}"/>
               </a:ext>
             </a:extLst>
           </p:cNvPr>
@@ -5975,40 +7402,232 @@
           <a:p>
             <a:r>
               <a:rPr lang="en-GB" dirty="0"/>
-              <a:t>Basic Simulation</a:t>
-            </a:r>
-          </a:p>
-        </p:txBody>
-      </p:sp>
-      <p:sp>
-        <p:nvSpPr>
-          <p:cNvPr id="3" name="Content Placeholder 2">
+              <a:t>Simple Pendulum</a:t>
+            </a:r>
+          </a:p>
+        </p:txBody>
+      </p:sp>
+      <mc:AlternateContent xmlns:mc="http://schemas.openxmlformats.org/markup-compatibility/2006">
+        <mc:Choice xmlns:a14="http://schemas.microsoft.com/office/drawing/2010/main" Requires="a14">
+          <p:sp>
+            <p:nvSpPr>
+              <p:cNvPr id="3" name="Content Placeholder 2">
+                <a:extLst>
+                  <a:ext uri="{FF2B5EF4-FFF2-40B4-BE49-F238E27FC236}">
+                    <a16:creationId xmlns:a16="http://schemas.microsoft.com/office/drawing/2014/main" id="{F5446691-AB2B-4CC3-8C1F-9EF67192E9DD}"/>
+                  </a:ext>
+                </a:extLst>
+              </p:cNvPr>
+              <p:cNvSpPr>
+                <a:spLocks noGrp="1"/>
+              </p:cNvSpPr>
+              <p:nvPr>
+                <p:ph idx="1"/>
+              </p:nvPr>
+            </p:nvSpPr>
+            <p:spPr>
+              <a:xfrm>
+                <a:off x="499115" y="2275553"/>
+                <a:ext cx="3753288" cy="3636511"/>
+              </a:xfrm>
+            </p:spPr>
+            <p:txBody>
+              <a:bodyPr>
+                <a:normAutofit/>
+              </a:bodyPr>
+              <a:lstStyle/>
+              <a:p>
+                <a:pPr marL="0" indent="0" algn="ctr">
+                  <a:buNone/>
+                </a:pPr>
+                <a:r>
+                  <a:rPr lang="en-GB" sz="3200" dirty="0">
+                    <a:latin typeface="Calibri" panose="020F0502020204030204" pitchFamily="34" charset="0"/>
+                    <a:cs typeface="Calibri" panose="020F0502020204030204" pitchFamily="34" charset="0"/>
+                  </a:rPr>
+                  <a:t>A = </a:t>
+                </a:r>
+                <a14:m>
+                  <m:oMath xmlns:m="http://schemas.openxmlformats.org/officeDocument/2006/math">
+                    <m:d>
+                      <m:dPr>
+                        <m:begChr m:val="["/>
+                        <m:endChr m:val="]"/>
+                        <m:ctrlPr>
+                          <a:rPr lang="en-GB" sz="3200" i="1" smtClean="0">
+                            <a:latin typeface="Cambria Math" panose="02040503050406030204" pitchFamily="18" charset="0"/>
+                            <a:cs typeface="Calibri" panose="020F0502020204030204" pitchFamily="34" charset="0"/>
+                          </a:rPr>
+                        </m:ctrlPr>
+                      </m:dPr>
+                      <m:e>
+                        <m:m>
+                          <m:mPr>
+                            <m:mcs>
+                              <m:mc>
+                                <m:mcPr>
+                                  <m:count m:val="2"/>
+                                  <m:mcJc m:val="center"/>
+                                </m:mcPr>
+                              </m:mc>
+                            </m:mcs>
+                            <m:ctrlPr>
+                              <a:rPr lang="en-GB" sz="3200" i="1" smtClean="0">
+                                <a:latin typeface="Cambria Math" panose="02040503050406030204" pitchFamily="18" charset="0"/>
+                                <a:cs typeface="Calibri" panose="020F0502020204030204" pitchFamily="34" charset="0"/>
+                              </a:rPr>
+                            </m:ctrlPr>
+                          </m:mPr>
+                          <m:mr>
+                            <m:e>
+                              <m:r>
+                                <m:rPr>
+                                  <m:brk m:alnAt="7"/>
+                                </m:rPr>
+                                <a:rPr lang="en-GB" sz="3200" b="0" i="1" smtClean="0">
+                                  <a:latin typeface="Cambria Math" panose="02040503050406030204" pitchFamily="18" charset="0"/>
+                                  <a:cs typeface="Calibri" panose="020F0502020204030204" pitchFamily="34" charset="0"/>
+                                </a:rPr>
+                                <m:t>0</m:t>
+                              </m:r>
+                            </m:e>
+                            <m:e>
+                              <m:r>
+                                <a:rPr lang="en-GB" sz="3200" b="0" i="1" smtClean="0">
+                                  <a:latin typeface="Cambria Math" panose="02040503050406030204" pitchFamily="18" charset="0"/>
+                                  <a:cs typeface="Calibri" panose="020F0502020204030204" pitchFamily="34" charset="0"/>
+                                </a:rPr>
+                                <m:t>1</m:t>
+                              </m:r>
+                            </m:e>
+                          </m:mr>
+                          <m:mr>
+                            <m:e>
+                              <m:r>
+                                <a:rPr lang="en-GB" sz="3200" b="0" i="1" smtClean="0">
+                                  <a:latin typeface="Cambria Math" panose="02040503050406030204" pitchFamily="18" charset="0"/>
+                                  <a:cs typeface="Calibri" panose="020F0502020204030204" pitchFamily="34" charset="0"/>
+                                </a:rPr>
+                                <m:t>−</m:t>
+                              </m:r>
+                              <m:r>
+                                <m:rPr>
+                                  <m:sty m:val="p"/>
+                                </m:rPr>
+                                <a:rPr lang="en-GB" sz="3200" b="0" i="0" smtClean="0">
+                                  <a:latin typeface="Cambria Math" panose="02040503050406030204" pitchFamily="18" charset="0"/>
+                                  <a:cs typeface="Calibri" panose="020F0502020204030204" pitchFamily="34" charset="0"/>
+                                </a:rPr>
+                                <m:t>mg</m:t>
+                              </m:r>
+                            </m:e>
+                            <m:e>
+                              <m:r>
+                                <a:rPr lang="en-GB" sz="3200" b="0" i="1" smtClean="0">
+                                  <a:latin typeface="Cambria Math" panose="02040503050406030204" pitchFamily="18" charset="0"/>
+                                  <a:cs typeface="Calibri" panose="020F0502020204030204" pitchFamily="34" charset="0"/>
+                                </a:rPr>
+                                <m:t>𝛾</m:t>
+                              </m:r>
+                            </m:e>
+                          </m:mr>
+                        </m:m>
+                      </m:e>
+                    </m:d>
+                  </m:oMath>
+                </a14:m>
+                <a:endParaRPr lang="en-GB" sz="3200" dirty="0">
+                  <a:latin typeface="Calibri" panose="020F0502020204030204" pitchFamily="34" charset="0"/>
+                  <a:cs typeface="Calibri" panose="020F0502020204030204" pitchFamily="34" charset="0"/>
+                </a:endParaRPr>
+              </a:p>
+            </p:txBody>
+          </p:sp>
+        </mc:Choice>
+        <mc:Fallback>
+          <p:sp>
+            <p:nvSpPr>
+              <p:cNvPr id="3" name="Content Placeholder 2">
+                <a:extLst>
+                  <a:ext uri="{FF2B5EF4-FFF2-40B4-BE49-F238E27FC236}">
+                    <a16:creationId xmlns:a16="http://schemas.microsoft.com/office/drawing/2014/main" id="{F5446691-AB2B-4CC3-8C1F-9EF67192E9DD}"/>
+                  </a:ext>
+                </a:extLst>
+              </p:cNvPr>
+              <p:cNvSpPr>
+                <a:spLocks noGrp="1" noRot="1" noChangeAspect="1" noMove="1" noResize="1" noEditPoints="1" noAdjustHandles="1" noChangeArrowheads="1" noChangeShapeType="1" noTextEdit="1"/>
+              </p:cNvSpPr>
+              <p:nvPr>
+                <p:ph idx="1"/>
+              </p:nvPr>
+            </p:nvSpPr>
+            <p:spPr>
+              <a:xfrm>
+                <a:off x="499115" y="2275553"/>
+                <a:ext cx="3753288" cy="3636511"/>
+              </a:xfrm>
+              <a:blipFill>
+                <a:blip r:embed="rId2"/>
+                <a:stretch>
+                  <a:fillRect/>
+                </a:stretch>
+              </a:blipFill>
+            </p:spPr>
+            <p:txBody>
+              <a:bodyPr/>
+              <a:lstStyle/>
+              <a:p>
+                <a:r>
+                  <a:rPr lang="en-GB">
+                    <a:noFill/>
+                  </a:rPr>
+                  <a:t> </a:t>
+                </a:r>
+              </a:p>
+            </p:txBody>
+          </p:sp>
+        </mc:Fallback>
+      </mc:AlternateContent>
+      <p:pic>
+        <p:nvPicPr>
+          <p:cNvPr id="8" name="Graphic 7">
             <a:extLst>
               <a:ext uri="{FF2B5EF4-FFF2-40B4-BE49-F238E27FC236}">
-                <a16:creationId xmlns:a16="http://schemas.microsoft.com/office/drawing/2014/main" id="{71602EAF-8007-45A0-9E08-230C7D06EB0B}"/>
+                <a16:creationId xmlns:a16="http://schemas.microsoft.com/office/drawing/2014/main" id="{C5426A50-B637-4272-A90B-72278B8D3CAB}"/>
               </a:ext>
             </a:extLst>
           </p:cNvPr>
-          <p:cNvSpPr>
-            <a:spLocks noGrp="1"/>
-          </p:cNvSpPr>
-          <p:nvPr>
-            <p:ph idx="1"/>
-          </p:nvPr>
-        </p:nvSpPr>
-        <p:spPr/>
-        <p:txBody>
-          <a:bodyPr/>
-          <a:lstStyle/>
-          <a:p>
-            <a:endParaRPr lang="en-GB"/>
-          </a:p>
-        </p:txBody>
-      </p:sp>
+          <p:cNvPicPr>
+            <a:picLocks noChangeAspect="1"/>
+          </p:cNvPicPr>
+          <p:nvPr/>
+        </p:nvPicPr>
+        <p:blipFill>
+          <a:blip r:embed="rId3">
+            <a:extLst>
+              <a:ext uri="{96DAC541-7B7A-43D3-8B79-37D633B846F1}">
+                <asvg:svgBlip xmlns:asvg="http://schemas.microsoft.com/office/drawing/2016/SVG/main" r:embed="rId4"/>
+              </a:ext>
+            </a:extLst>
+          </a:blip>
+          <a:stretch>
+            <a:fillRect/>
+          </a:stretch>
+        </p:blipFill>
+        <p:spPr>
+          <a:xfrm>
+            <a:off x="5514598" y="2843212"/>
+            <a:ext cx="5867400" cy="3171825"/>
+          </a:xfrm>
+          <a:prstGeom prst="rect">
+            <a:avLst/>
+          </a:prstGeom>
+        </p:spPr>
+      </p:pic>
     </p:spTree>
     <p:extLst>
       <p:ext uri="{BB962C8B-B14F-4D97-AF65-F5344CB8AC3E}">
-        <p14:creationId xmlns:p14="http://schemas.microsoft.com/office/powerpoint/2010/main" val="243116075"/>
+        <p14:creationId xmlns:p14="http://schemas.microsoft.com/office/powerpoint/2010/main" val="4025972403"/>
       </p:ext>
     </p:extLst>
   </p:cSld>
@@ -6040,7 +7659,7 @@
           <p:cNvPr id="2" name="Title 1">
             <a:extLst>
               <a:ext uri="{FF2B5EF4-FFF2-40B4-BE49-F238E27FC236}">
-                <a16:creationId xmlns:a16="http://schemas.microsoft.com/office/drawing/2014/main" id="{6625D631-FEAE-470F-8CBB-FE597626BCE6}"/>
+                <a16:creationId xmlns:a16="http://schemas.microsoft.com/office/drawing/2014/main" id="{B3727FEA-138A-44E1-8EBD-F5FE3E8D75E1}"/>
               </a:ext>
             </a:extLst>
           </p:cNvPr>
@@ -6058,17 +7677,17 @@
           <a:p>
             <a:r>
               <a:rPr lang="en-GB" dirty="0"/>
-              <a:t>Comparison</a:t>
-            </a:r>
-          </a:p>
-        </p:txBody>
-      </p:sp>
-      <p:sp>
-        <p:nvSpPr>
-          <p:cNvPr id="3" name="Content Placeholder 2">
+              <a:t>What is a controller?</a:t>
+            </a:r>
+          </a:p>
+        </p:txBody>
+      </p:sp>
+      <p:sp>
+        <p:nvSpPr>
+          <p:cNvPr id="5" name="Content Placeholder 2">
             <a:extLst>
               <a:ext uri="{FF2B5EF4-FFF2-40B4-BE49-F238E27FC236}">
-                <a16:creationId xmlns:a16="http://schemas.microsoft.com/office/drawing/2014/main" id="{612D349C-5B01-4F96-A4B4-BC9FCBA31EA1}"/>
+                <a16:creationId xmlns:a16="http://schemas.microsoft.com/office/drawing/2014/main" id="{F4558A00-AC44-4181-9136-6C43FA63A0CE}"/>
               </a:ext>
             </a:extLst>
           </p:cNvPr>
@@ -6079,19 +7698,76 @@
             <p:ph idx="1"/>
           </p:nvPr>
         </p:nvSpPr>
-        <p:spPr/>
-        <p:txBody>
-          <a:bodyPr/>
-          <a:lstStyle/>
-          <a:p>
-            <a:endParaRPr lang="en-GB"/>
-          </a:p>
-        </p:txBody>
-      </p:sp>
+        <p:spPr>
+          <a:xfrm>
+            <a:off x="819150" y="2222500"/>
+            <a:ext cx="4622800" cy="3636963"/>
+          </a:xfrm>
+        </p:spPr>
+        <p:txBody>
+          <a:bodyPr>
+            <a:normAutofit/>
+          </a:bodyPr>
+          <a:lstStyle/>
+          <a:p>
+            <a:pPr marL="0" indent="0" algn="ctr">
+              <a:buNone/>
+            </a:pPr>
+            <a:r>
+              <a:rPr lang="en-GB" sz="3200" dirty="0"/>
+              <a:t>x[k+1] = </a:t>
+            </a:r>
+            <a:r>
+              <a:rPr lang="en-GB" sz="3200" dirty="0" err="1"/>
+              <a:t>Ax</a:t>
+            </a:r>
+            <a:r>
+              <a:rPr lang="en-GB" sz="3200" dirty="0"/>
+              <a:t>[k]</a:t>
+            </a:r>
+          </a:p>
+        </p:txBody>
+      </p:sp>
+      <p:pic>
+        <p:nvPicPr>
+          <p:cNvPr id="12" name="Graphic 11">
+            <a:extLst>
+              <a:ext uri="{FF2B5EF4-FFF2-40B4-BE49-F238E27FC236}">
+                <a16:creationId xmlns:a16="http://schemas.microsoft.com/office/drawing/2014/main" id="{A40FA99A-3A2E-48C3-B7AA-DDCDD922E921}"/>
+              </a:ext>
+            </a:extLst>
+          </p:cNvPr>
+          <p:cNvPicPr>
+            <a:picLocks noChangeAspect="1"/>
+          </p:cNvPicPr>
+          <p:nvPr/>
+        </p:nvPicPr>
+        <p:blipFill>
+          <a:blip r:embed="rId2">
+            <a:extLst>
+              <a:ext uri="{96DAC541-7B7A-43D3-8B79-37D633B846F1}">
+                <asvg:svgBlip xmlns:asvg="http://schemas.microsoft.com/office/drawing/2016/SVG/main" r:embed="rId3"/>
+              </a:ext>
+            </a:extLst>
+          </a:blip>
+          <a:stretch>
+            <a:fillRect/>
+          </a:stretch>
+        </p:blipFill>
+        <p:spPr>
+          <a:xfrm>
+            <a:off x="6429560" y="2580628"/>
+            <a:ext cx="4552950" cy="3543300"/>
+          </a:xfrm>
+          <a:prstGeom prst="rect">
+            <a:avLst/>
+          </a:prstGeom>
+        </p:spPr>
+      </p:pic>
     </p:spTree>
     <p:extLst>
       <p:ext uri="{BB962C8B-B14F-4D97-AF65-F5344CB8AC3E}">
-        <p14:creationId xmlns:p14="http://schemas.microsoft.com/office/powerpoint/2010/main" val="2521250869"/>
+        <p14:creationId xmlns:p14="http://schemas.microsoft.com/office/powerpoint/2010/main" val="4133701527"/>
       </p:ext>
     </p:extLst>
   </p:cSld>
@@ -6123,7 +7799,7 @@
           <p:cNvPr id="2" name="Title 1">
             <a:extLst>
               <a:ext uri="{FF2B5EF4-FFF2-40B4-BE49-F238E27FC236}">
-                <a16:creationId xmlns:a16="http://schemas.microsoft.com/office/drawing/2014/main" id="{2E036755-ECC2-477A-AF5A-EC3EC6987C8C}"/>
+                <a16:creationId xmlns:a16="http://schemas.microsoft.com/office/drawing/2014/main" id="{B3727FEA-138A-44E1-8EBD-F5FE3E8D75E1}"/>
               </a:ext>
             </a:extLst>
           </p:cNvPr>
@@ -6141,17 +7817,17 @@
           <a:p>
             <a:r>
               <a:rPr lang="en-GB" dirty="0"/>
-              <a:t>Conclusions</a:t>
-            </a:r>
-          </a:p>
-        </p:txBody>
-      </p:sp>
-      <p:sp>
-        <p:nvSpPr>
-          <p:cNvPr id="3" name="Content Placeholder 2">
+              <a:t>What is a controller?</a:t>
+            </a:r>
+          </a:p>
+        </p:txBody>
+      </p:sp>
+      <p:sp>
+        <p:nvSpPr>
+          <p:cNvPr id="5" name="Content Placeholder 2">
             <a:extLst>
               <a:ext uri="{FF2B5EF4-FFF2-40B4-BE49-F238E27FC236}">
-                <a16:creationId xmlns:a16="http://schemas.microsoft.com/office/drawing/2014/main" id="{A57BC6E5-9A40-4672-B05A-31BED3A3CF9C}"/>
+                <a16:creationId xmlns:a16="http://schemas.microsoft.com/office/drawing/2014/main" id="{F4558A00-AC44-4181-9136-6C43FA63A0CE}"/>
               </a:ext>
             </a:extLst>
           </p:cNvPr>
@@ -6162,19 +7838,76 @@
             <p:ph idx="1"/>
           </p:nvPr>
         </p:nvSpPr>
-        <p:spPr/>
-        <p:txBody>
-          <a:bodyPr/>
-          <a:lstStyle/>
-          <a:p>
-            <a:endParaRPr lang="en-GB"/>
-          </a:p>
-        </p:txBody>
-      </p:sp>
+        <p:spPr>
+          <a:xfrm>
+            <a:off x="819150" y="2222500"/>
+            <a:ext cx="4622800" cy="3636963"/>
+          </a:xfrm>
+        </p:spPr>
+        <p:txBody>
+          <a:bodyPr>
+            <a:normAutofit/>
+          </a:bodyPr>
+          <a:lstStyle/>
+          <a:p>
+            <a:pPr marL="0" indent="0" algn="ctr">
+              <a:buNone/>
+            </a:pPr>
+            <a:r>
+              <a:rPr lang="en-GB" sz="3200" dirty="0"/>
+              <a:t>x[k+1] = </a:t>
+            </a:r>
+            <a:r>
+              <a:rPr lang="en-GB" sz="3200" dirty="0" err="1"/>
+              <a:t>Ax</a:t>
+            </a:r>
+            <a:r>
+              <a:rPr lang="en-GB" sz="3200" dirty="0"/>
+              <a:t>[k]+Bu[k]</a:t>
+            </a:r>
+          </a:p>
+        </p:txBody>
+      </p:sp>
+      <p:pic>
+        <p:nvPicPr>
+          <p:cNvPr id="6" name="Graphic 5">
+            <a:extLst>
+              <a:ext uri="{FF2B5EF4-FFF2-40B4-BE49-F238E27FC236}">
+                <a16:creationId xmlns:a16="http://schemas.microsoft.com/office/drawing/2014/main" id="{3E433BBA-C5E0-4765-946B-7891F97FB776}"/>
+              </a:ext>
+            </a:extLst>
+          </p:cNvPr>
+          <p:cNvPicPr>
+            <a:picLocks noChangeAspect="1"/>
+          </p:cNvPicPr>
+          <p:nvPr/>
+        </p:nvPicPr>
+        <p:blipFill>
+          <a:blip r:embed="rId2">
+            <a:extLst>
+              <a:ext uri="{96DAC541-7B7A-43D3-8B79-37D633B846F1}">
+                <asvg:svgBlip xmlns:asvg="http://schemas.microsoft.com/office/drawing/2016/SVG/main" r:embed="rId3"/>
+              </a:ext>
+            </a:extLst>
+          </a:blip>
+          <a:stretch>
+            <a:fillRect/>
+          </a:stretch>
+        </p:blipFill>
+        <p:spPr>
+          <a:xfrm>
+            <a:off x="6844683" y="2201116"/>
+            <a:ext cx="4952814" cy="4315818"/>
+          </a:xfrm>
+          <a:prstGeom prst="rect">
+            <a:avLst/>
+          </a:prstGeom>
+        </p:spPr>
+      </p:pic>
     </p:spTree>
     <p:extLst>
       <p:ext uri="{BB962C8B-B14F-4D97-AF65-F5344CB8AC3E}">
-        <p14:creationId xmlns:p14="http://schemas.microsoft.com/office/powerpoint/2010/main" val="740166718"/>
+        <p14:creationId xmlns:p14="http://schemas.microsoft.com/office/powerpoint/2010/main" val="3059638335"/>
       </p:ext>
     </p:extLst>
   </p:cSld>

</xml_diff>